<commit_message>
mandando diapositivas y cambios en bd
</commit_message>
<xml_diff>
--- a/Documentacion/Base de Datos - Agencia de Viajes.pptx
+++ b/Documentacion/Base de Datos - Agencia de Viajes.pptx
@@ -9,10 +9,10 @@
     <p:sldMasterId id="2147483671" r:id="rId5"/>
   </p:sldMasterIdLst>
   <p:notesMasterIdLst>
-    <p:notesMasterId r:id="rId18"/>
+    <p:notesMasterId r:id="rId19"/>
   </p:notesMasterIdLst>
   <p:handoutMasterIdLst>
-    <p:handoutMasterId r:id="rId19"/>
+    <p:handoutMasterId r:id="rId20"/>
   </p:handoutMasterIdLst>
   <p:sldIdLst>
     <p:sldId id="664" r:id="rId6"/>
@@ -20,13 +20,14 @@
     <p:sldId id="689" r:id="rId8"/>
     <p:sldId id="670" r:id="rId9"/>
     <p:sldId id="690" r:id="rId10"/>
-    <p:sldId id="691" r:id="rId11"/>
-    <p:sldId id="692" r:id="rId12"/>
-    <p:sldId id="693" r:id="rId13"/>
-    <p:sldId id="694" r:id="rId14"/>
+    <p:sldId id="696" r:id="rId11"/>
+    <p:sldId id="691" r:id="rId12"/>
+    <p:sldId id="692" r:id="rId13"/>
+    <p:sldId id="693" r:id="rId14"/>
     <p:sldId id="695" r:id="rId15"/>
-    <p:sldId id="669" r:id="rId16"/>
-    <p:sldId id="680" r:id="rId17"/>
+    <p:sldId id="694" r:id="rId16"/>
+    <p:sldId id="669" r:id="rId17"/>
+    <p:sldId id="680" r:id="rId18"/>
   </p:sldIdLst>
   <p:sldSz cx="12192000" cy="6858000"/>
   <p:notesSz cx="6858000" cy="9144000"/>
@@ -125,6 +126,22 @@
       </a:defRPr>
     </a:lvl9pPr>
   </p:defaultTextStyle>
+  <p:extLst>
+    <p:ext uri="{EFAFB233-063F-42B5-8137-9DF3F51BA10A}">
+      <p15:sldGuideLst xmlns:p15="http://schemas.microsoft.com/office/powerpoint/2012/main">
+        <p15:guide id="1" orient="horz" pos="2131">
+          <p15:clr>
+            <a:srgbClr val="A4A3A4"/>
+          </p15:clr>
+        </p15:guide>
+        <p15:guide id="2" pos="3840">
+          <p15:clr>
+            <a:srgbClr val="A4A3A4"/>
+          </p15:clr>
+        </p15:guide>
+      </p15:sldGuideLst>
+    </p:ext>
+  </p:extLst>
 </p:presentation>
 </file>
 
@@ -7183,8 +7200,8 @@
         </p:nvSpPr>
         <p:spPr>
           <a:xfrm flipH="1">
-            <a:off x="7250197" y="5279409"/>
-            <a:ext cx="4941803" cy="1028161"/>
+            <a:off x="5619700" y="211650"/>
+            <a:ext cx="5716656" cy="1308677"/>
           </a:xfrm>
           <a:prstGeom prst="chevron">
             <a:avLst>
@@ -7332,7 +7349,23 @@
                   <a:schemeClr val="bg1"/>
                 </a:solidFill>
               </a:rPr>
-              <a:t>El usuario…</a:t>
+              <a:t>Un Tour-paquete puede visitar uno o muchos sitios turísticos, hoteles, restaurantes, lagos, ruinas </a:t>
+            </a:r>
+            <a:r>
+              <a:rPr lang="es-ES" altLang="zh-CN" sz="2000" dirty="0" err="1" smtClean="0">
+                <a:solidFill>
+                  <a:schemeClr val="bg1"/>
+                </a:solidFill>
+              </a:rPr>
+              <a:t>etc</a:t>
+            </a:r>
+            <a:r>
+              <a:rPr lang="es-ES" altLang="zh-CN" sz="2000" dirty="0" smtClean="0">
+                <a:solidFill>
+                  <a:schemeClr val="bg1"/>
+                </a:solidFill>
+              </a:rPr>
+              <a:t> </a:t>
             </a:r>
             <a:endParaRPr lang="zh-CN" altLang="en-US" sz="2000" dirty="0">
               <a:solidFill>
@@ -7389,17 +7422,359 @@
           <a:effectLst>
             <a:reflection blurRad="12700" stA="38000" endPos="28000" dist="5000" dir="5400000" sy="-100000" algn="bl" rotWithShape="0"/>
           </a:effectLst>
-          <a:extLst>
-            <a:ext uri="{909E8E84-426E-40DD-AFC4-6F175D3DCCD1}">
-              <a14:hiddenFill xmlns:a14="http://schemas.microsoft.com/office/drawing/2010/main">
-                <a:solidFill>
-                  <a:schemeClr val="accent1"/>
-                </a:solidFill>
-              </a14:hiddenFill>
-            </a:ext>
-          </a:extLst>
+          <a:extLst/>
         </p:spPr>
       </p:pic>
+      <p:sp>
+        <p:nvSpPr>
+          <p:cNvPr id="5" name="箭头: V 形 105"/>
+          <p:cNvSpPr/>
+          <p:nvPr/>
+        </p:nvSpPr>
+        <p:spPr>
+          <a:xfrm flipH="1">
+            <a:off x="5636572" y="2027597"/>
+            <a:ext cx="5716656" cy="1308677"/>
+          </a:xfrm>
+          <a:prstGeom prst="chevron">
+            <a:avLst>
+              <a:gd name="adj" fmla="val 29021"/>
+            </a:avLst>
+          </a:prstGeom>
+          <a:gradFill flip="none" rotWithShape="1">
+            <a:gsLst>
+              <a:gs pos="0">
+                <a:srgbClr val="F9AC7D"/>
+              </a:gs>
+              <a:gs pos="100000">
+                <a:srgbClr val="F28893"/>
+              </a:gs>
+            </a:gsLst>
+            <a:lin ang="0" scaled="1"/>
+            <a:tileRect/>
+          </a:gradFill>
+          <a:ln>
+            <a:noFill/>
+          </a:ln>
+        </p:spPr>
+        <p:style>
+          <a:lnRef idx="2">
+            <a:schemeClr val="accent1">
+              <a:shade val="50000"/>
+            </a:schemeClr>
+          </a:lnRef>
+          <a:fillRef idx="1">
+            <a:schemeClr val="accent1"/>
+          </a:fillRef>
+          <a:effectRef idx="0">
+            <a:schemeClr val="accent1"/>
+          </a:effectRef>
+          <a:fontRef idx="minor">
+            <a:schemeClr val="lt1"/>
+          </a:fontRef>
+        </p:style>
+        <p:txBody>
+          <a:bodyPr rtlCol="0" anchor="ctr"/>
+          <a:lstStyle>
+            <a:defPPr>
+              <a:defRPr lang="en-US">
+                <a:solidFill>
+                  <a:schemeClr val="lt1"/>
+                </a:solidFill>
+              </a:defRPr>
+            </a:defPPr>
+            <a:lvl1pPr marL="0" algn="l" defTabSz="685800" rtl="0" eaLnBrk="1" latinLnBrk="0" hangingPunct="1">
+              <a:defRPr sz="1350" kern="1200">
+                <a:solidFill>
+                  <a:schemeClr val="lt1"/>
+                </a:solidFill>
+                <a:latin typeface="+mn-lt"/>
+                <a:ea typeface="+mn-ea"/>
+                <a:cs typeface="+mn-cs"/>
+              </a:defRPr>
+            </a:lvl1pPr>
+            <a:lvl2pPr marL="342900" algn="l" defTabSz="685800" rtl="0" eaLnBrk="1" latinLnBrk="0" hangingPunct="1">
+              <a:defRPr sz="1350" kern="1200">
+                <a:solidFill>
+                  <a:schemeClr val="lt1"/>
+                </a:solidFill>
+                <a:latin typeface="+mn-lt"/>
+                <a:ea typeface="+mn-ea"/>
+                <a:cs typeface="+mn-cs"/>
+              </a:defRPr>
+            </a:lvl2pPr>
+            <a:lvl3pPr marL="685800" algn="l" defTabSz="685800" rtl="0" eaLnBrk="1" latinLnBrk="0" hangingPunct="1">
+              <a:defRPr sz="1350" kern="1200">
+                <a:solidFill>
+                  <a:schemeClr val="lt1"/>
+                </a:solidFill>
+                <a:latin typeface="+mn-lt"/>
+                <a:ea typeface="+mn-ea"/>
+                <a:cs typeface="+mn-cs"/>
+              </a:defRPr>
+            </a:lvl3pPr>
+            <a:lvl4pPr marL="1028700" algn="l" defTabSz="685800" rtl="0" eaLnBrk="1" latinLnBrk="0" hangingPunct="1">
+              <a:defRPr sz="1350" kern="1200">
+                <a:solidFill>
+                  <a:schemeClr val="lt1"/>
+                </a:solidFill>
+                <a:latin typeface="+mn-lt"/>
+                <a:ea typeface="+mn-ea"/>
+                <a:cs typeface="+mn-cs"/>
+              </a:defRPr>
+            </a:lvl4pPr>
+            <a:lvl5pPr marL="1371600" algn="l" defTabSz="685800" rtl="0" eaLnBrk="1" latinLnBrk="0" hangingPunct="1">
+              <a:defRPr sz="1350" kern="1200">
+                <a:solidFill>
+                  <a:schemeClr val="lt1"/>
+                </a:solidFill>
+                <a:latin typeface="+mn-lt"/>
+                <a:ea typeface="+mn-ea"/>
+                <a:cs typeface="+mn-cs"/>
+              </a:defRPr>
+            </a:lvl5pPr>
+            <a:lvl6pPr marL="1714500" algn="l" defTabSz="685800" rtl="0" eaLnBrk="1" latinLnBrk="0" hangingPunct="1">
+              <a:defRPr sz="1350" kern="1200">
+                <a:solidFill>
+                  <a:schemeClr val="lt1"/>
+                </a:solidFill>
+                <a:latin typeface="+mn-lt"/>
+                <a:ea typeface="+mn-ea"/>
+                <a:cs typeface="+mn-cs"/>
+              </a:defRPr>
+            </a:lvl6pPr>
+            <a:lvl7pPr marL="2057400" algn="l" defTabSz="685800" rtl="0" eaLnBrk="1" latinLnBrk="0" hangingPunct="1">
+              <a:defRPr sz="1350" kern="1200">
+                <a:solidFill>
+                  <a:schemeClr val="lt1"/>
+                </a:solidFill>
+                <a:latin typeface="+mn-lt"/>
+                <a:ea typeface="+mn-ea"/>
+                <a:cs typeface="+mn-cs"/>
+              </a:defRPr>
+            </a:lvl7pPr>
+            <a:lvl8pPr marL="2400300" algn="l" defTabSz="685800" rtl="0" eaLnBrk="1" latinLnBrk="0" hangingPunct="1">
+              <a:defRPr sz="1350" kern="1200">
+                <a:solidFill>
+                  <a:schemeClr val="lt1"/>
+                </a:solidFill>
+                <a:latin typeface="+mn-lt"/>
+                <a:ea typeface="+mn-ea"/>
+                <a:cs typeface="+mn-cs"/>
+              </a:defRPr>
+            </a:lvl8pPr>
+            <a:lvl9pPr marL="2743200" algn="l" defTabSz="685800" rtl="0" eaLnBrk="1" latinLnBrk="0" hangingPunct="1">
+              <a:defRPr sz="1350" kern="1200">
+                <a:solidFill>
+                  <a:schemeClr val="lt1"/>
+                </a:solidFill>
+                <a:latin typeface="+mn-lt"/>
+                <a:ea typeface="+mn-ea"/>
+                <a:cs typeface="+mn-cs"/>
+              </a:defRPr>
+            </a:lvl9pPr>
+          </a:lstStyle>
+          <a:p>
+            <a:pPr algn="ctr"/>
+            <a:r>
+              <a:rPr lang="es-ES" altLang="zh-CN" sz="2000" dirty="0" smtClean="0">
+                <a:solidFill>
+                  <a:schemeClr val="bg1"/>
+                </a:solidFill>
+              </a:rPr>
+              <a:t>La unión de sitios turísticos y tours-paquetes es el itinerario el cual detallara que lugar se visitara en un </a:t>
+            </a:r>
+            <a:r>
+              <a:rPr lang="es-ES" altLang="zh-CN" sz="2000" dirty="0" err="1" smtClean="0">
+                <a:solidFill>
+                  <a:schemeClr val="bg1"/>
+                </a:solidFill>
+              </a:rPr>
+              <a:t>dia</a:t>
+            </a:r>
+            <a:r>
+              <a:rPr lang="es-ES" altLang="zh-CN" sz="2000" dirty="0" smtClean="0">
+                <a:solidFill>
+                  <a:schemeClr val="bg1"/>
+                </a:solidFill>
+              </a:rPr>
+              <a:t> determinado</a:t>
+            </a:r>
+            <a:endParaRPr lang="zh-CN" altLang="en-US" sz="2000" dirty="0">
+              <a:solidFill>
+                <a:schemeClr val="bg1"/>
+              </a:solidFill>
+            </a:endParaRPr>
+          </a:p>
+        </p:txBody>
+      </p:sp>
+      <p:sp>
+        <p:nvSpPr>
+          <p:cNvPr id="6" name="箭头: V 形 105"/>
+          <p:cNvSpPr/>
+          <p:nvPr/>
+        </p:nvSpPr>
+        <p:spPr>
+          <a:xfrm flipH="1">
+            <a:off x="5518712" y="3645321"/>
+            <a:ext cx="5716656" cy="1308677"/>
+          </a:xfrm>
+          <a:prstGeom prst="chevron">
+            <a:avLst>
+              <a:gd name="adj" fmla="val 29021"/>
+            </a:avLst>
+          </a:prstGeom>
+          <a:gradFill flip="none" rotWithShape="1">
+            <a:gsLst>
+              <a:gs pos="0">
+                <a:srgbClr val="F9AC7D"/>
+              </a:gs>
+              <a:gs pos="100000">
+                <a:srgbClr val="F28893"/>
+              </a:gs>
+            </a:gsLst>
+            <a:lin ang="0" scaled="1"/>
+            <a:tileRect/>
+          </a:gradFill>
+          <a:ln>
+            <a:noFill/>
+          </a:ln>
+        </p:spPr>
+        <p:style>
+          <a:lnRef idx="2">
+            <a:schemeClr val="accent1">
+              <a:shade val="50000"/>
+            </a:schemeClr>
+          </a:lnRef>
+          <a:fillRef idx="1">
+            <a:schemeClr val="accent1"/>
+          </a:fillRef>
+          <a:effectRef idx="0">
+            <a:schemeClr val="accent1"/>
+          </a:effectRef>
+          <a:fontRef idx="minor">
+            <a:schemeClr val="lt1"/>
+          </a:fontRef>
+        </p:style>
+        <p:txBody>
+          <a:bodyPr rtlCol="0" anchor="ctr"/>
+          <a:lstStyle>
+            <a:defPPr>
+              <a:defRPr lang="en-US">
+                <a:solidFill>
+                  <a:schemeClr val="lt1"/>
+                </a:solidFill>
+              </a:defRPr>
+            </a:defPPr>
+            <a:lvl1pPr marL="0" algn="l" defTabSz="685800" rtl="0" eaLnBrk="1" latinLnBrk="0" hangingPunct="1">
+              <a:defRPr sz="1350" kern="1200">
+                <a:solidFill>
+                  <a:schemeClr val="lt1"/>
+                </a:solidFill>
+                <a:latin typeface="+mn-lt"/>
+                <a:ea typeface="+mn-ea"/>
+                <a:cs typeface="+mn-cs"/>
+              </a:defRPr>
+            </a:lvl1pPr>
+            <a:lvl2pPr marL="342900" algn="l" defTabSz="685800" rtl="0" eaLnBrk="1" latinLnBrk="0" hangingPunct="1">
+              <a:defRPr sz="1350" kern="1200">
+                <a:solidFill>
+                  <a:schemeClr val="lt1"/>
+                </a:solidFill>
+                <a:latin typeface="+mn-lt"/>
+                <a:ea typeface="+mn-ea"/>
+                <a:cs typeface="+mn-cs"/>
+              </a:defRPr>
+            </a:lvl2pPr>
+            <a:lvl3pPr marL="685800" algn="l" defTabSz="685800" rtl="0" eaLnBrk="1" latinLnBrk="0" hangingPunct="1">
+              <a:defRPr sz="1350" kern="1200">
+                <a:solidFill>
+                  <a:schemeClr val="lt1"/>
+                </a:solidFill>
+                <a:latin typeface="+mn-lt"/>
+                <a:ea typeface="+mn-ea"/>
+                <a:cs typeface="+mn-cs"/>
+              </a:defRPr>
+            </a:lvl3pPr>
+            <a:lvl4pPr marL="1028700" algn="l" defTabSz="685800" rtl="0" eaLnBrk="1" latinLnBrk="0" hangingPunct="1">
+              <a:defRPr sz="1350" kern="1200">
+                <a:solidFill>
+                  <a:schemeClr val="lt1"/>
+                </a:solidFill>
+                <a:latin typeface="+mn-lt"/>
+                <a:ea typeface="+mn-ea"/>
+                <a:cs typeface="+mn-cs"/>
+              </a:defRPr>
+            </a:lvl4pPr>
+            <a:lvl5pPr marL="1371600" algn="l" defTabSz="685800" rtl="0" eaLnBrk="1" latinLnBrk="0" hangingPunct="1">
+              <a:defRPr sz="1350" kern="1200">
+                <a:solidFill>
+                  <a:schemeClr val="lt1"/>
+                </a:solidFill>
+                <a:latin typeface="+mn-lt"/>
+                <a:ea typeface="+mn-ea"/>
+                <a:cs typeface="+mn-cs"/>
+              </a:defRPr>
+            </a:lvl5pPr>
+            <a:lvl6pPr marL="1714500" algn="l" defTabSz="685800" rtl="0" eaLnBrk="1" latinLnBrk="0" hangingPunct="1">
+              <a:defRPr sz="1350" kern="1200">
+                <a:solidFill>
+                  <a:schemeClr val="lt1"/>
+                </a:solidFill>
+                <a:latin typeface="+mn-lt"/>
+                <a:ea typeface="+mn-ea"/>
+                <a:cs typeface="+mn-cs"/>
+              </a:defRPr>
+            </a:lvl6pPr>
+            <a:lvl7pPr marL="2057400" algn="l" defTabSz="685800" rtl="0" eaLnBrk="1" latinLnBrk="0" hangingPunct="1">
+              <a:defRPr sz="1350" kern="1200">
+                <a:solidFill>
+                  <a:schemeClr val="lt1"/>
+                </a:solidFill>
+                <a:latin typeface="+mn-lt"/>
+                <a:ea typeface="+mn-ea"/>
+                <a:cs typeface="+mn-cs"/>
+              </a:defRPr>
+            </a:lvl7pPr>
+            <a:lvl8pPr marL="2400300" algn="l" defTabSz="685800" rtl="0" eaLnBrk="1" latinLnBrk="0" hangingPunct="1">
+              <a:defRPr sz="1350" kern="1200">
+                <a:solidFill>
+                  <a:schemeClr val="lt1"/>
+                </a:solidFill>
+                <a:latin typeface="+mn-lt"/>
+                <a:ea typeface="+mn-ea"/>
+                <a:cs typeface="+mn-cs"/>
+              </a:defRPr>
+            </a:lvl8pPr>
+            <a:lvl9pPr marL="2743200" algn="l" defTabSz="685800" rtl="0" eaLnBrk="1" latinLnBrk="0" hangingPunct="1">
+              <a:defRPr sz="1350" kern="1200">
+                <a:solidFill>
+                  <a:schemeClr val="lt1"/>
+                </a:solidFill>
+                <a:latin typeface="+mn-lt"/>
+                <a:ea typeface="+mn-ea"/>
+                <a:cs typeface="+mn-cs"/>
+              </a:defRPr>
+            </a:lvl9pPr>
+          </a:lstStyle>
+          <a:p>
+            <a:pPr algn="ctr"/>
+            <a:r>
+              <a:rPr lang="es-ES" altLang="zh-CN" sz="2000" dirty="0" smtClean="0">
+                <a:solidFill>
+                  <a:schemeClr val="bg1"/>
+                </a:solidFill>
+              </a:rPr>
+              <a:t>Los sitios turísticos poseerán muchas fotos, con esto se lograra crear una galería de fotos para la pagina web</a:t>
+            </a:r>
+            <a:endParaRPr lang="zh-CN" altLang="en-US" sz="2000" dirty="0">
+              <a:solidFill>
+                <a:schemeClr val="bg1"/>
+              </a:solidFill>
+            </a:endParaRPr>
+          </a:p>
+        </p:txBody>
+      </p:sp>
     </p:spTree>
     <p:extLst>
       <p:ext uri="{BB962C8B-B14F-4D97-AF65-F5344CB8AC3E}">
@@ -7433,6 +7808,406 @@
 </file>
 
 <file path=ppt/slides/slide11.xml><?xml version="1.0" encoding="utf-8"?>
+<p:sld xmlns:a="http://schemas.openxmlformats.org/drawingml/2006/main" xmlns:r="http://schemas.openxmlformats.org/officeDocument/2006/relationships" xmlns:p="http://schemas.openxmlformats.org/presentationml/2006/main">
+  <p:cSld>
+    <p:spTree>
+      <p:nvGrpSpPr>
+        <p:cNvPr id="1" name=""/>
+        <p:cNvGrpSpPr/>
+        <p:nvPr/>
+      </p:nvGrpSpPr>
+      <p:grpSpPr>
+        <a:xfrm>
+          <a:off x="0" y="0"/>
+          <a:ext cx="0" cy="0"/>
+          <a:chOff x="0" y="0"/>
+          <a:chExt cx="0" cy="0"/>
+        </a:xfrm>
+      </p:grpSpPr>
+      <p:sp>
+        <p:nvSpPr>
+          <p:cNvPr id="34" name="Rectangle 33"/>
+          <p:cNvSpPr/>
+          <p:nvPr/>
+        </p:nvSpPr>
+        <p:spPr>
+          <a:xfrm>
+            <a:off x="0" y="6115607"/>
+            <a:ext cx="12192000" cy="1047733"/>
+          </a:xfrm>
+          <a:prstGeom prst="rect">
+            <a:avLst/>
+          </a:prstGeom>
+          <a:solidFill>
+            <a:srgbClr val="D2D0D0"/>
+          </a:solidFill>
+          <a:ln>
+            <a:noFill/>
+          </a:ln>
+        </p:spPr>
+        <p:style>
+          <a:lnRef idx="2">
+            <a:schemeClr val="accent1">
+              <a:shade val="50000"/>
+            </a:schemeClr>
+          </a:lnRef>
+          <a:fillRef idx="1">
+            <a:schemeClr val="accent1"/>
+          </a:fillRef>
+          <a:effectRef idx="0">
+            <a:schemeClr val="accent1"/>
+          </a:effectRef>
+          <a:fontRef idx="minor">
+            <a:schemeClr val="lt1"/>
+          </a:fontRef>
+        </p:style>
+        <p:txBody>
+          <a:bodyPr rtlCol="0" anchor="ctr"/>
+          <a:lstStyle/>
+          <a:p>
+            <a:pPr algn="ctr" fontAlgn="base">
+              <a:spcBef>
+                <a:spcPct val="0"/>
+              </a:spcBef>
+              <a:spcAft>
+                <a:spcPct val="0"/>
+              </a:spcAft>
+            </a:pPr>
+            <a:endParaRPr lang="en-US" sz="2800">
+              <a:solidFill>
+                <a:prstClr val="white"/>
+              </a:solidFill>
+              <a:cs typeface="+mn-ea"/>
+              <a:sym typeface="+mn-lt"/>
+            </a:endParaRPr>
+          </a:p>
+        </p:txBody>
+      </p:sp>
+      <p:sp>
+        <p:nvSpPr>
+          <p:cNvPr id="10" name="箭头: V 形 105"/>
+          <p:cNvSpPr/>
+          <p:nvPr/>
+        </p:nvSpPr>
+        <p:spPr>
+          <a:xfrm flipH="1">
+            <a:off x="6313760" y="838200"/>
+            <a:ext cx="5705641" cy="3634648"/>
+          </a:xfrm>
+          <a:prstGeom prst="chevron">
+            <a:avLst>
+              <a:gd name="adj" fmla="val 29021"/>
+            </a:avLst>
+          </a:prstGeom>
+          <a:gradFill flip="none" rotWithShape="1">
+            <a:gsLst>
+              <a:gs pos="0">
+                <a:srgbClr val="F9AC7D"/>
+              </a:gs>
+              <a:gs pos="100000">
+                <a:srgbClr val="F28893"/>
+              </a:gs>
+            </a:gsLst>
+            <a:lin ang="0" scaled="1"/>
+            <a:tileRect/>
+          </a:gradFill>
+          <a:ln>
+            <a:noFill/>
+          </a:ln>
+        </p:spPr>
+        <p:style>
+          <a:lnRef idx="2">
+            <a:schemeClr val="accent1">
+              <a:shade val="50000"/>
+            </a:schemeClr>
+          </a:lnRef>
+          <a:fillRef idx="1">
+            <a:schemeClr val="accent1"/>
+          </a:fillRef>
+          <a:effectRef idx="0">
+            <a:schemeClr val="accent1"/>
+          </a:effectRef>
+          <a:fontRef idx="minor">
+            <a:schemeClr val="lt1"/>
+          </a:fontRef>
+        </p:style>
+        <p:txBody>
+          <a:bodyPr rtlCol="0" anchor="ctr"/>
+          <a:lstStyle>
+            <a:defPPr>
+              <a:defRPr lang="en-US">
+                <a:solidFill>
+                  <a:schemeClr val="lt1"/>
+                </a:solidFill>
+              </a:defRPr>
+            </a:defPPr>
+            <a:lvl1pPr marL="0" algn="l" defTabSz="685800" rtl="0" eaLnBrk="1" latinLnBrk="0" hangingPunct="1">
+              <a:defRPr sz="1350" kern="1200">
+                <a:solidFill>
+                  <a:schemeClr val="lt1"/>
+                </a:solidFill>
+                <a:latin typeface="+mn-lt"/>
+                <a:ea typeface="+mn-ea"/>
+                <a:cs typeface="+mn-cs"/>
+              </a:defRPr>
+            </a:lvl1pPr>
+            <a:lvl2pPr marL="342900" algn="l" defTabSz="685800" rtl="0" eaLnBrk="1" latinLnBrk="0" hangingPunct="1">
+              <a:defRPr sz="1350" kern="1200">
+                <a:solidFill>
+                  <a:schemeClr val="lt1"/>
+                </a:solidFill>
+                <a:latin typeface="+mn-lt"/>
+                <a:ea typeface="+mn-ea"/>
+                <a:cs typeface="+mn-cs"/>
+              </a:defRPr>
+            </a:lvl2pPr>
+            <a:lvl3pPr marL="685800" algn="l" defTabSz="685800" rtl="0" eaLnBrk="1" latinLnBrk="0" hangingPunct="1">
+              <a:defRPr sz="1350" kern="1200">
+                <a:solidFill>
+                  <a:schemeClr val="lt1"/>
+                </a:solidFill>
+                <a:latin typeface="+mn-lt"/>
+                <a:ea typeface="+mn-ea"/>
+                <a:cs typeface="+mn-cs"/>
+              </a:defRPr>
+            </a:lvl3pPr>
+            <a:lvl4pPr marL="1028700" algn="l" defTabSz="685800" rtl="0" eaLnBrk="1" latinLnBrk="0" hangingPunct="1">
+              <a:defRPr sz="1350" kern="1200">
+                <a:solidFill>
+                  <a:schemeClr val="lt1"/>
+                </a:solidFill>
+                <a:latin typeface="+mn-lt"/>
+                <a:ea typeface="+mn-ea"/>
+                <a:cs typeface="+mn-cs"/>
+              </a:defRPr>
+            </a:lvl4pPr>
+            <a:lvl5pPr marL="1371600" algn="l" defTabSz="685800" rtl="0" eaLnBrk="1" latinLnBrk="0" hangingPunct="1">
+              <a:defRPr sz="1350" kern="1200">
+                <a:solidFill>
+                  <a:schemeClr val="lt1"/>
+                </a:solidFill>
+                <a:latin typeface="+mn-lt"/>
+                <a:ea typeface="+mn-ea"/>
+                <a:cs typeface="+mn-cs"/>
+              </a:defRPr>
+            </a:lvl5pPr>
+            <a:lvl6pPr marL="1714500" algn="l" defTabSz="685800" rtl="0" eaLnBrk="1" latinLnBrk="0" hangingPunct="1">
+              <a:defRPr sz="1350" kern="1200">
+                <a:solidFill>
+                  <a:schemeClr val="lt1"/>
+                </a:solidFill>
+                <a:latin typeface="+mn-lt"/>
+                <a:ea typeface="+mn-ea"/>
+                <a:cs typeface="+mn-cs"/>
+              </a:defRPr>
+            </a:lvl6pPr>
+            <a:lvl7pPr marL="2057400" algn="l" defTabSz="685800" rtl="0" eaLnBrk="1" latinLnBrk="0" hangingPunct="1">
+              <a:defRPr sz="1350" kern="1200">
+                <a:solidFill>
+                  <a:schemeClr val="lt1"/>
+                </a:solidFill>
+                <a:latin typeface="+mn-lt"/>
+                <a:ea typeface="+mn-ea"/>
+                <a:cs typeface="+mn-cs"/>
+              </a:defRPr>
+            </a:lvl7pPr>
+            <a:lvl8pPr marL="2400300" algn="l" defTabSz="685800" rtl="0" eaLnBrk="1" latinLnBrk="0" hangingPunct="1">
+              <a:defRPr sz="1350" kern="1200">
+                <a:solidFill>
+                  <a:schemeClr val="lt1"/>
+                </a:solidFill>
+                <a:latin typeface="+mn-lt"/>
+                <a:ea typeface="+mn-ea"/>
+                <a:cs typeface="+mn-cs"/>
+              </a:defRPr>
+            </a:lvl8pPr>
+            <a:lvl9pPr marL="2743200" algn="l" defTabSz="685800" rtl="0" eaLnBrk="1" latinLnBrk="0" hangingPunct="1">
+              <a:defRPr sz="1350" kern="1200">
+                <a:solidFill>
+                  <a:schemeClr val="lt1"/>
+                </a:solidFill>
+                <a:latin typeface="+mn-lt"/>
+                <a:ea typeface="+mn-ea"/>
+                <a:cs typeface="+mn-cs"/>
+              </a:defRPr>
+            </a:lvl9pPr>
+          </a:lstStyle>
+          <a:p>
+            <a:pPr algn="ctr"/>
+            <a:r>
+              <a:rPr lang="es-ES" altLang="zh-CN" sz="2000" dirty="0" smtClean="0">
+                <a:solidFill>
+                  <a:schemeClr val="bg1"/>
+                </a:solidFill>
+              </a:rPr>
+              <a:t>El usuario podrá hacer la cotización de todos los servicios que posee la agencia, tours-paquetes, renta de vehículos, compra de boleos de avión, asesorías migratorias, cargo </a:t>
+            </a:r>
+            <a:r>
+              <a:rPr lang="es-ES" altLang="zh-CN" sz="2000" dirty="0" err="1" smtClean="0">
+                <a:solidFill>
+                  <a:schemeClr val="bg1"/>
+                </a:solidFill>
+              </a:rPr>
+              <a:t>express</a:t>
+            </a:r>
+            <a:r>
+              <a:rPr lang="es-ES" altLang="zh-CN" sz="2000" dirty="0" smtClean="0">
+                <a:solidFill>
+                  <a:schemeClr val="bg1"/>
+                </a:solidFill>
+              </a:rPr>
+              <a:t> </a:t>
+            </a:r>
+            <a:r>
+              <a:rPr lang="es-ES" altLang="zh-CN" sz="2000" dirty="0" err="1" smtClean="0">
+                <a:solidFill>
+                  <a:schemeClr val="bg1"/>
+                </a:solidFill>
+              </a:rPr>
+              <a:t>etc</a:t>
+            </a:r>
+            <a:r>
+              <a:rPr lang="es-ES" altLang="zh-CN" sz="2000" dirty="0" smtClean="0">
+                <a:solidFill>
+                  <a:schemeClr val="bg1"/>
+                </a:solidFill>
+              </a:rPr>
+              <a:t>,</a:t>
+            </a:r>
+          </a:p>
+          <a:p>
+            <a:pPr algn="ctr"/>
+            <a:r>
+              <a:rPr lang="es-ES" altLang="zh-CN" sz="2000" dirty="0" smtClean="0">
+                <a:solidFill>
+                  <a:schemeClr val="bg1"/>
+                </a:solidFill>
+              </a:rPr>
+              <a:t>Los cuales serán enviados a atención al </a:t>
+            </a:r>
+            <a:r>
+              <a:rPr lang="es-ES" altLang="zh-CN" sz="2000" dirty="0" err="1" smtClean="0">
+                <a:solidFill>
+                  <a:schemeClr val="bg1"/>
+                </a:solidFill>
+              </a:rPr>
+              <a:t>cliene</a:t>
+            </a:r>
+            <a:r>
+              <a:rPr lang="es-ES" altLang="zh-CN" sz="2000" dirty="0" smtClean="0">
+                <a:solidFill>
+                  <a:schemeClr val="bg1"/>
+                </a:solidFill>
+              </a:rPr>
+              <a:t> para ser </a:t>
+            </a:r>
+            <a:r>
+              <a:rPr lang="es-ES" altLang="zh-CN" sz="2000" dirty="0" err="1" smtClean="0">
+                <a:solidFill>
+                  <a:schemeClr val="bg1"/>
+                </a:solidFill>
+              </a:rPr>
+              <a:t>aprovados</a:t>
+            </a:r>
+            <a:r>
+              <a:rPr lang="es-ES" altLang="zh-CN" sz="2000" dirty="0" smtClean="0">
+                <a:solidFill>
+                  <a:schemeClr val="bg1"/>
+                </a:solidFill>
+              </a:rPr>
+              <a:t> o rechazados</a:t>
+            </a:r>
+            <a:endParaRPr lang="zh-CN" altLang="en-US" sz="2000" dirty="0">
+              <a:solidFill>
+                <a:schemeClr val="bg1"/>
+              </a:solidFill>
+            </a:endParaRPr>
+          </a:p>
+        </p:txBody>
+      </p:sp>
+      <p:pic>
+        <p:nvPicPr>
+          <p:cNvPr id="6146" name="Picture 2"/>
+          <p:cNvPicPr>
+            <a:picLocks noChangeAspect="1" noChangeArrowheads="1"/>
+          </p:cNvPicPr>
+          <p:nvPr/>
+        </p:nvPicPr>
+        <p:blipFill>
+          <a:blip r:embed="rId2">
+            <a:extLst>
+              <a:ext uri="{28A0092B-C50C-407E-A947-70E740481C1C}">
+                <a14:useLocalDpi xmlns:a14="http://schemas.microsoft.com/office/drawing/2010/main" val="0"/>
+              </a:ext>
+            </a:extLst>
+          </a:blip>
+          <a:srcRect/>
+          <a:stretch>
+            <a:fillRect/>
+          </a:stretch>
+        </p:blipFill>
+        <p:spPr bwMode="auto">
+          <a:xfrm>
+            <a:off x="504825" y="838200"/>
+            <a:ext cx="5591175" cy="5010670"/>
+          </a:xfrm>
+          <a:prstGeom prst="roundRect">
+            <a:avLst>
+              <a:gd name="adj" fmla="val 8594"/>
+            </a:avLst>
+          </a:prstGeom>
+          <a:solidFill>
+            <a:srgbClr val="FFFFFF">
+              <a:shade val="85000"/>
+            </a:srgbClr>
+          </a:solidFill>
+          <a:ln w="9525">
+            <a:solidFill>
+              <a:schemeClr val="tx1"/>
+            </a:solidFill>
+            <a:miter lim="800000"/>
+            <a:headEnd/>
+            <a:tailEnd/>
+          </a:ln>
+          <a:effectLst>
+            <a:reflection blurRad="12700" stA="38000" endPos="28000" dist="5000" dir="5400000" sy="-100000" algn="bl" rotWithShape="0"/>
+          </a:effectLst>
+          <a:extLst/>
+        </p:spPr>
+      </p:pic>
+    </p:spTree>
+    <p:extLst>
+      <p:ext uri="{BB962C8B-B14F-4D97-AF65-F5344CB8AC3E}">
+        <p14:creationId xmlns:p14="http://schemas.microsoft.com/office/powerpoint/2010/main" val="1792306883"/>
+      </p:ext>
+    </p:extLst>
+  </p:cSld>
+  <p:clrMapOvr>
+    <a:masterClrMapping/>
+  </p:clrMapOvr>
+  <mc:AlternateContent xmlns:mc="http://schemas.openxmlformats.org/markup-compatibility/2006" xmlns:p14="http://schemas.microsoft.com/office/powerpoint/2010/main">
+    <mc:Choice Requires="p14">
+      <p:transition spd="slow" p14:dur="1500">
+        <p:random/>
+      </p:transition>
+    </mc:Choice>
+    <mc:Fallback xmlns="">
+      <p:transition spd="slow">
+        <p:random/>
+      </p:transition>
+    </mc:Fallback>
+  </mc:AlternateContent>
+  <p:timing>
+    <p:tnLst>
+      <p:par>
+        <p:cTn id="1" dur="indefinite" restart="never" nodeType="tmRoot"/>
+      </p:par>
+    </p:tnLst>
+  </p:timing>
+</p:sld>
+</file>
+
+<file path=ppt/slides/slide12.xml><?xml version="1.0" encoding="utf-8"?>
 <p:sld xmlns:a="http://schemas.openxmlformats.org/drawingml/2006/main" xmlns:r="http://schemas.openxmlformats.org/officeDocument/2006/relationships" xmlns:p="http://schemas.openxmlformats.org/presentationml/2006/main">
   <p:cSld>
     <p:spTree>
@@ -11035,7 +11810,7 @@
 </p:sld>
 </file>
 
-<file path=ppt/slides/slide12.xml><?xml version="1.0" encoding="utf-8"?>
+<file path=ppt/slides/slide13.xml><?xml version="1.0" encoding="utf-8"?>
 <p:sld xmlns:a="http://schemas.openxmlformats.org/drawingml/2006/main" xmlns:r="http://schemas.openxmlformats.org/officeDocument/2006/relationships" xmlns:p="http://schemas.openxmlformats.org/presentationml/2006/main">
   <p:cSld>
     <p:spTree>
@@ -12896,15 +13671,7 @@
           <a:effectLst>
             <a:reflection blurRad="12700" stA="38000" endPos="28000" dist="5000" dir="5400000" sy="-100000" algn="bl" rotWithShape="0"/>
           </a:effectLst>
-          <a:extLst>
-            <a:ext uri="{909E8E84-426E-40DD-AFC4-6F175D3DCCD1}">
-              <a14:hiddenFill xmlns:a14="http://schemas.microsoft.com/office/drawing/2010/main">
-                <a:solidFill>
-                  <a:schemeClr val="accent1"/>
-                </a:solidFill>
-              </a14:hiddenFill>
-            </a:ext>
-          </a:extLst>
+          <a:extLst/>
         </p:spPr>
       </p:pic>
       <p:sp>
@@ -13082,8 +13849,8 @@
         </p:nvSpPr>
         <p:spPr>
           <a:xfrm flipH="1">
-            <a:off x="5815846" y="3429000"/>
-            <a:ext cx="4941803" cy="1028161"/>
+            <a:off x="5815845" y="3429000"/>
+            <a:ext cx="4941804" cy="1297236"/>
           </a:xfrm>
           <a:prstGeom prst="chevron">
             <a:avLst>
@@ -13231,7 +13998,15 @@
                   <a:schemeClr val="bg1"/>
                 </a:solidFill>
               </a:rPr>
-              <a:t>En el campo “nivel” se detallara el tipo de usuario</a:t>
+              <a:t>En el campo “nivel” se detallara el tipo de </a:t>
+            </a:r>
+            <a:r>
+              <a:rPr lang="es-ES" altLang="zh-CN" sz="2000" dirty="0" smtClean="0">
+                <a:solidFill>
+                  <a:schemeClr val="bg1"/>
+                </a:solidFill>
+              </a:rPr>
+              <a:t>usuario, los cuales pueden ser un cliente normal y un administrador</a:t>
             </a:r>
             <a:endParaRPr lang="zh-CN" altLang="en-US" sz="2000" dirty="0">
               <a:solidFill>
@@ -13357,7 +14132,7 @@
         </p:nvSpPr>
         <p:spPr>
           <a:xfrm flipH="1">
-            <a:off x="6406398" y="2440959"/>
+            <a:off x="5998774" y="182501"/>
             <a:ext cx="4941803" cy="1028161"/>
           </a:xfrm>
           <a:prstGeom prst="chevron">
@@ -13563,15 +14338,419 @@
           <a:effectLst>
             <a:reflection blurRad="12700" stA="38000" endPos="28000" dist="5000" dir="5400000" sy="-100000" algn="bl" rotWithShape="0"/>
           </a:effectLst>
-          <a:extLst>
-            <a:ext uri="{909E8E84-426E-40DD-AFC4-6F175D3DCCD1}">
-              <a14:hiddenFill xmlns:a14="http://schemas.microsoft.com/office/drawing/2010/main">
-                <a:solidFill>
-                  <a:schemeClr val="accent1"/>
-                </a:solidFill>
-              </a14:hiddenFill>
-            </a:ext>
-          </a:extLst>
+          <a:extLst/>
+        </p:spPr>
+      </p:pic>
+      <p:sp>
+        <p:nvSpPr>
+          <p:cNvPr id="5" name="箭头: V 形 105"/>
+          <p:cNvSpPr/>
+          <p:nvPr/>
+        </p:nvSpPr>
+        <p:spPr>
+          <a:xfrm flipH="1">
+            <a:off x="5883006" y="1432193"/>
+            <a:ext cx="4978615" cy="2379643"/>
+          </a:xfrm>
+          <a:prstGeom prst="chevron">
+            <a:avLst>
+              <a:gd name="adj" fmla="val 29021"/>
+            </a:avLst>
+          </a:prstGeom>
+          <a:gradFill flip="none" rotWithShape="1">
+            <a:gsLst>
+              <a:gs pos="0">
+                <a:srgbClr val="F9AC7D"/>
+              </a:gs>
+              <a:gs pos="100000">
+                <a:srgbClr val="F28893"/>
+              </a:gs>
+            </a:gsLst>
+            <a:lin ang="0" scaled="1"/>
+            <a:tileRect/>
+          </a:gradFill>
+          <a:ln>
+            <a:noFill/>
+          </a:ln>
+        </p:spPr>
+        <p:style>
+          <a:lnRef idx="2">
+            <a:schemeClr val="accent1">
+              <a:shade val="50000"/>
+            </a:schemeClr>
+          </a:lnRef>
+          <a:fillRef idx="1">
+            <a:schemeClr val="accent1"/>
+          </a:fillRef>
+          <a:effectRef idx="0">
+            <a:schemeClr val="accent1"/>
+          </a:effectRef>
+          <a:fontRef idx="minor">
+            <a:schemeClr val="lt1"/>
+          </a:fontRef>
+        </p:style>
+        <p:txBody>
+          <a:bodyPr rtlCol="0" anchor="ctr"/>
+          <a:lstStyle>
+            <a:defPPr>
+              <a:defRPr lang="en-US">
+                <a:solidFill>
+                  <a:schemeClr val="lt1"/>
+                </a:solidFill>
+              </a:defRPr>
+            </a:defPPr>
+            <a:lvl1pPr marL="0" algn="l" defTabSz="685800" rtl="0" eaLnBrk="1" latinLnBrk="0" hangingPunct="1">
+              <a:defRPr sz="1350" kern="1200">
+                <a:solidFill>
+                  <a:schemeClr val="lt1"/>
+                </a:solidFill>
+                <a:latin typeface="+mn-lt"/>
+                <a:ea typeface="+mn-ea"/>
+                <a:cs typeface="+mn-cs"/>
+              </a:defRPr>
+            </a:lvl1pPr>
+            <a:lvl2pPr marL="342900" algn="l" defTabSz="685800" rtl="0" eaLnBrk="1" latinLnBrk="0" hangingPunct="1">
+              <a:defRPr sz="1350" kern="1200">
+                <a:solidFill>
+                  <a:schemeClr val="lt1"/>
+                </a:solidFill>
+                <a:latin typeface="+mn-lt"/>
+                <a:ea typeface="+mn-ea"/>
+                <a:cs typeface="+mn-cs"/>
+              </a:defRPr>
+            </a:lvl2pPr>
+            <a:lvl3pPr marL="685800" algn="l" defTabSz="685800" rtl="0" eaLnBrk="1" latinLnBrk="0" hangingPunct="1">
+              <a:defRPr sz="1350" kern="1200">
+                <a:solidFill>
+                  <a:schemeClr val="lt1"/>
+                </a:solidFill>
+                <a:latin typeface="+mn-lt"/>
+                <a:ea typeface="+mn-ea"/>
+                <a:cs typeface="+mn-cs"/>
+              </a:defRPr>
+            </a:lvl3pPr>
+            <a:lvl4pPr marL="1028700" algn="l" defTabSz="685800" rtl="0" eaLnBrk="1" latinLnBrk="0" hangingPunct="1">
+              <a:defRPr sz="1350" kern="1200">
+                <a:solidFill>
+                  <a:schemeClr val="lt1"/>
+                </a:solidFill>
+                <a:latin typeface="+mn-lt"/>
+                <a:ea typeface="+mn-ea"/>
+                <a:cs typeface="+mn-cs"/>
+              </a:defRPr>
+            </a:lvl4pPr>
+            <a:lvl5pPr marL="1371600" algn="l" defTabSz="685800" rtl="0" eaLnBrk="1" latinLnBrk="0" hangingPunct="1">
+              <a:defRPr sz="1350" kern="1200">
+                <a:solidFill>
+                  <a:schemeClr val="lt1"/>
+                </a:solidFill>
+                <a:latin typeface="+mn-lt"/>
+                <a:ea typeface="+mn-ea"/>
+                <a:cs typeface="+mn-cs"/>
+              </a:defRPr>
+            </a:lvl5pPr>
+            <a:lvl6pPr marL="1714500" algn="l" defTabSz="685800" rtl="0" eaLnBrk="1" latinLnBrk="0" hangingPunct="1">
+              <a:defRPr sz="1350" kern="1200">
+                <a:solidFill>
+                  <a:schemeClr val="lt1"/>
+                </a:solidFill>
+                <a:latin typeface="+mn-lt"/>
+                <a:ea typeface="+mn-ea"/>
+                <a:cs typeface="+mn-cs"/>
+              </a:defRPr>
+            </a:lvl6pPr>
+            <a:lvl7pPr marL="2057400" algn="l" defTabSz="685800" rtl="0" eaLnBrk="1" latinLnBrk="0" hangingPunct="1">
+              <a:defRPr sz="1350" kern="1200">
+                <a:solidFill>
+                  <a:schemeClr val="lt1"/>
+                </a:solidFill>
+                <a:latin typeface="+mn-lt"/>
+                <a:ea typeface="+mn-ea"/>
+                <a:cs typeface="+mn-cs"/>
+              </a:defRPr>
+            </a:lvl7pPr>
+            <a:lvl8pPr marL="2400300" algn="l" defTabSz="685800" rtl="0" eaLnBrk="1" latinLnBrk="0" hangingPunct="1">
+              <a:defRPr sz="1350" kern="1200">
+                <a:solidFill>
+                  <a:schemeClr val="lt1"/>
+                </a:solidFill>
+                <a:latin typeface="+mn-lt"/>
+                <a:ea typeface="+mn-ea"/>
+                <a:cs typeface="+mn-cs"/>
+              </a:defRPr>
+            </a:lvl8pPr>
+            <a:lvl9pPr marL="2743200" algn="l" defTabSz="685800" rtl="0" eaLnBrk="1" latinLnBrk="0" hangingPunct="1">
+              <a:defRPr sz="1350" kern="1200">
+                <a:solidFill>
+                  <a:schemeClr val="lt1"/>
+                </a:solidFill>
+                <a:latin typeface="+mn-lt"/>
+                <a:ea typeface="+mn-ea"/>
+                <a:cs typeface="+mn-cs"/>
+              </a:defRPr>
+            </a:lvl9pPr>
+          </a:lstStyle>
+          <a:p>
+            <a:pPr algn="ctr"/>
+            <a:r>
+              <a:rPr lang="es-ES" altLang="zh-CN" sz="2000" dirty="0" smtClean="0">
+                <a:solidFill>
+                  <a:schemeClr val="bg1"/>
+                </a:solidFill>
+              </a:rPr>
+              <a:t>En la tabla vuelo se detallaran los datos generales de un vuelo, los precios por asiento, fecha de salida, si se realizara con escalas, si es con ida y vuelta, la aerolínea, una fot</a:t>
+            </a:r>
+            <a:r>
+              <a:rPr lang="es-ES" altLang="zh-CN" sz="2000" dirty="0" smtClean="0">
+                <a:solidFill>
+                  <a:schemeClr val="bg1"/>
+                </a:solidFill>
+              </a:rPr>
+              <a:t>o por para promocionar el vuelo </a:t>
+            </a:r>
+            <a:r>
+              <a:rPr lang="es-ES" altLang="zh-CN" sz="2000" dirty="0" err="1" smtClean="0">
+                <a:solidFill>
+                  <a:schemeClr val="bg1"/>
+                </a:solidFill>
+              </a:rPr>
+              <a:t>etc</a:t>
+            </a:r>
+            <a:endParaRPr lang="zh-CN" altLang="en-US" sz="2000" dirty="0">
+              <a:solidFill>
+                <a:schemeClr val="bg1"/>
+              </a:solidFill>
+            </a:endParaRPr>
+          </a:p>
+        </p:txBody>
+      </p:sp>
+      <p:sp>
+        <p:nvSpPr>
+          <p:cNvPr id="6" name="箭头: V 形 105"/>
+          <p:cNvSpPr/>
+          <p:nvPr/>
+        </p:nvSpPr>
+        <p:spPr>
+          <a:xfrm flipH="1">
+            <a:off x="5901411" y="4196254"/>
+            <a:ext cx="5039166" cy="1488451"/>
+          </a:xfrm>
+          <a:prstGeom prst="chevron">
+            <a:avLst>
+              <a:gd name="adj" fmla="val 29021"/>
+            </a:avLst>
+          </a:prstGeom>
+          <a:gradFill flip="none" rotWithShape="1">
+            <a:gsLst>
+              <a:gs pos="0">
+                <a:srgbClr val="F9AC7D"/>
+              </a:gs>
+              <a:gs pos="100000">
+                <a:srgbClr val="F28893"/>
+              </a:gs>
+            </a:gsLst>
+            <a:lin ang="0" scaled="1"/>
+            <a:tileRect/>
+          </a:gradFill>
+          <a:ln>
+            <a:noFill/>
+          </a:ln>
+        </p:spPr>
+        <p:style>
+          <a:lnRef idx="2">
+            <a:schemeClr val="accent1">
+              <a:shade val="50000"/>
+            </a:schemeClr>
+          </a:lnRef>
+          <a:fillRef idx="1">
+            <a:schemeClr val="accent1"/>
+          </a:fillRef>
+          <a:effectRef idx="0">
+            <a:schemeClr val="accent1"/>
+          </a:effectRef>
+          <a:fontRef idx="minor">
+            <a:schemeClr val="lt1"/>
+          </a:fontRef>
+        </p:style>
+        <p:txBody>
+          <a:bodyPr rtlCol="0" anchor="ctr"/>
+          <a:lstStyle>
+            <a:defPPr>
+              <a:defRPr lang="en-US">
+                <a:solidFill>
+                  <a:schemeClr val="lt1"/>
+                </a:solidFill>
+              </a:defRPr>
+            </a:defPPr>
+            <a:lvl1pPr marL="0" algn="l" defTabSz="685800" rtl="0" eaLnBrk="1" latinLnBrk="0" hangingPunct="1">
+              <a:defRPr sz="1350" kern="1200">
+                <a:solidFill>
+                  <a:schemeClr val="lt1"/>
+                </a:solidFill>
+                <a:latin typeface="+mn-lt"/>
+                <a:ea typeface="+mn-ea"/>
+                <a:cs typeface="+mn-cs"/>
+              </a:defRPr>
+            </a:lvl1pPr>
+            <a:lvl2pPr marL="342900" algn="l" defTabSz="685800" rtl="0" eaLnBrk="1" latinLnBrk="0" hangingPunct="1">
+              <a:defRPr sz="1350" kern="1200">
+                <a:solidFill>
+                  <a:schemeClr val="lt1"/>
+                </a:solidFill>
+                <a:latin typeface="+mn-lt"/>
+                <a:ea typeface="+mn-ea"/>
+                <a:cs typeface="+mn-cs"/>
+              </a:defRPr>
+            </a:lvl2pPr>
+            <a:lvl3pPr marL="685800" algn="l" defTabSz="685800" rtl="0" eaLnBrk="1" latinLnBrk="0" hangingPunct="1">
+              <a:defRPr sz="1350" kern="1200">
+                <a:solidFill>
+                  <a:schemeClr val="lt1"/>
+                </a:solidFill>
+                <a:latin typeface="+mn-lt"/>
+                <a:ea typeface="+mn-ea"/>
+                <a:cs typeface="+mn-cs"/>
+              </a:defRPr>
+            </a:lvl3pPr>
+            <a:lvl4pPr marL="1028700" algn="l" defTabSz="685800" rtl="0" eaLnBrk="1" latinLnBrk="0" hangingPunct="1">
+              <a:defRPr sz="1350" kern="1200">
+                <a:solidFill>
+                  <a:schemeClr val="lt1"/>
+                </a:solidFill>
+                <a:latin typeface="+mn-lt"/>
+                <a:ea typeface="+mn-ea"/>
+                <a:cs typeface="+mn-cs"/>
+              </a:defRPr>
+            </a:lvl4pPr>
+            <a:lvl5pPr marL="1371600" algn="l" defTabSz="685800" rtl="0" eaLnBrk="1" latinLnBrk="0" hangingPunct="1">
+              <a:defRPr sz="1350" kern="1200">
+                <a:solidFill>
+                  <a:schemeClr val="lt1"/>
+                </a:solidFill>
+                <a:latin typeface="+mn-lt"/>
+                <a:ea typeface="+mn-ea"/>
+                <a:cs typeface="+mn-cs"/>
+              </a:defRPr>
+            </a:lvl5pPr>
+            <a:lvl6pPr marL="1714500" algn="l" defTabSz="685800" rtl="0" eaLnBrk="1" latinLnBrk="0" hangingPunct="1">
+              <a:defRPr sz="1350" kern="1200">
+                <a:solidFill>
+                  <a:schemeClr val="lt1"/>
+                </a:solidFill>
+                <a:latin typeface="+mn-lt"/>
+                <a:ea typeface="+mn-ea"/>
+                <a:cs typeface="+mn-cs"/>
+              </a:defRPr>
+            </a:lvl6pPr>
+            <a:lvl7pPr marL="2057400" algn="l" defTabSz="685800" rtl="0" eaLnBrk="1" latinLnBrk="0" hangingPunct="1">
+              <a:defRPr sz="1350" kern="1200">
+                <a:solidFill>
+                  <a:schemeClr val="lt1"/>
+                </a:solidFill>
+                <a:latin typeface="+mn-lt"/>
+                <a:ea typeface="+mn-ea"/>
+                <a:cs typeface="+mn-cs"/>
+              </a:defRPr>
+            </a:lvl7pPr>
+            <a:lvl8pPr marL="2400300" algn="l" defTabSz="685800" rtl="0" eaLnBrk="1" latinLnBrk="0" hangingPunct="1">
+              <a:defRPr sz="1350" kern="1200">
+                <a:solidFill>
+                  <a:schemeClr val="lt1"/>
+                </a:solidFill>
+                <a:latin typeface="+mn-lt"/>
+                <a:ea typeface="+mn-ea"/>
+                <a:cs typeface="+mn-cs"/>
+              </a:defRPr>
+            </a:lvl8pPr>
+            <a:lvl9pPr marL="2743200" algn="l" defTabSz="685800" rtl="0" eaLnBrk="1" latinLnBrk="0" hangingPunct="1">
+              <a:defRPr sz="1350" kern="1200">
+                <a:solidFill>
+                  <a:schemeClr val="lt1"/>
+                </a:solidFill>
+                <a:latin typeface="+mn-lt"/>
+                <a:ea typeface="+mn-ea"/>
+                <a:cs typeface="+mn-cs"/>
+              </a:defRPr>
+            </a:lvl9pPr>
+          </a:lstStyle>
+          <a:p>
+            <a:pPr algn="ctr"/>
+            <a:r>
+              <a:rPr lang="es-ES" altLang="zh-CN" sz="2000" dirty="0" smtClean="0">
+                <a:solidFill>
+                  <a:schemeClr val="bg1"/>
+                </a:solidFill>
+              </a:rPr>
+              <a:t>En la reserva de vuelos se detallaran datos como si el usuario desea equipaje extra, si viajara con ni</a:t>
+            </a:r>
+            <a:r>
+              <a:rPr lang="es-SV" altLang="zh-CN" sz="2000" dirty="0" err="1" smtClean="0">
+                <a:solidFill>
+                  <a:schemeClr val="bg1"/>
+                </a:solidFill>
+              </a:rPr>
+              <a:t>ños</a:t>
+            </a:r>
+            <a:r>
+              <a:rPr lang="es-SV" altLang="zh-CN" sz="2000" dirty="0" smtClean="0">
+                <a:solidFill>
+                  <a:schemeClr val="bg1"/>
+                </a:solidFill>
+              </a:rPr>
+              <a:t> o con bebes, si se le </a:t>
+            </a:r>
+            <a:r>
+              <a:rPr lang="es-SV" altLang="zh-CN" sz="2000" dirty="0" err="1" smtClean="0">
+                <a:solidFill>
+                  <a:schemeClr val="bg1"/>
+                </a:solidFill>
+              </a:rPr>
+              <a:t>hara</a:t>
+            </a:r>
+            <a:r>
+              <a:rPr lang="es-SV" altLang="zh-CN" sz="2000" dirty="0" smtClean="0">
+                <a:solidFill>
+                  <a:schemeClr val="bg1"/>
+                </a:solidFill>
+              </a:rPr>
+              <a:t> un descuento et</a:t>
+            </a:r>
+            <a:endParaRPr lang="zh-CN" altLang="en-US" sz="2000" dirty="0">
+              <a:solidFill>
+                <a:schemeClr val="bg1"/>
+              </a:solidFill>
+            </a:endParaRPr>
+          </a:p>
+        </p:txBody>
+      </p:sp>
+      <p:pic>
+        <p:nvPicPr>
+          <p:cNvPr id="2" name="Imagen 1"/>
+          <p:cNvPicPr>
+            <a:picLocks noChangeAspect="1"/>
+          </p:cNvPicPr>
+          <p:nvPr/>
+        </p:nvPicPr>
+        <p:blipFill>
+          <a:blip r:embed="rId3">
+            <a:extLst>
+              <a:ext uri="{28A0092B-C50C-407E-A947-70E740481C1C}">
+                <a14:useLocalDpi xmlns:a14="http://schemas.microsoft.com/office/drawing/2010/main" val="0"/>
+              </a:ext>
+            </a:extLst>
+          </a:blip>
+          <a:stretch>
+            <a:fillRect/>
+          </a:stretch>
+        </p:blipFill>
+        <p:spPr>
+          <a:xfrm>
+            <a:off x="1068993" y="65748"/>
+            <a:ext cx="4402131" cy="3830863"/>
+          </a:xfrm>
+          <a:prstGeom prst="rect">
+            <a:avLst/>
+          </a:prstGeom>
         </p:spPr>
       </p:pic>
     </p:spTree>
@@ -13677,173 +14856,6 @@
           </a:p>
         </p:txBody>
       </p:sp>
-      <p:sp>
-        <p:nvSpPr>
-          <p:cNvPr id="10" name="箭头: V 形 105"/>
-          <p:cNvSpPr/>
-          <p:nvPr/>
-        </p:nvSpPr>
-        <p:spPr>
-          <a:xfrm flipH="1">
-            <a:off x="7250197" y="5279409"/>
-            <a:ext cx="4941803" cy="1028161"/>
-          </a:xfrm>
-          <a:prstGeom prst="chevron">
-            <a:avLst>
-              <a:gd name="adj" fmla="val 29021"/>
-            </a:avLst>
-          </a:prstGeom>
-          <a:gradFill flip="none" rotWithShape="1">
-            <a:gsLst>
-              <a:gs pos="0">
-                <a:srgbClr val="F9AC7D"/>
-              </a:gs>
-              <a:gs pos="100000">
-                <a:srgbClr val="F28893"/>
-              </a:gs>
-            </a:gsLst>
-            <a:lin ang="0" scaled="1"/>
-            <a:tileRect/>
-          </a:gradFill>
-          <a:ln>
-            <a:noFill/>
-          </a:ln>
-        </p:spPr>
-        <p:style>
-          <a:lnRef idx="2">
-            <a:schemeClr val="accent1">
-              <a:shade val="50000"/>
-            </a:schemeClr>
-          </a:lnRef>
-          <a:fillRef idx="1">
-            <a:schemeClr val="accent1"/>
-          </a:fillRef>
-          <a:effectRef idx="0">
-            <a:schemeClr val="accent1"/>
-          </a:effectRef>
-          <a:fontRef idx="minor">
-            <a:schemeClr val="lt1"/>
-          </a:fontRef>
-        </p:style>
-        <p:txBody>
-          <a:bodyPr rtlCol="0" anchor="ctr"/>
-          <a:lstStyle>
-            <a:defPPr>
-              <a:defRPr lang="en-US">
-                <a:solidFill>
-                  <a:schemeClr val="lt1"/>
-                </a:solidFill>
-              </a:defRPr>
-            </a:defPPr>
-            <a:lvl1pPr marL="0" algn="l" defTabSz="685800" rtl="0" eaLnBrk="1" latinLnBrk="0" hangingPunct="1">
-              <a:defRPr sz="1350" kern="1200">
-                <a:solidFill>
-                  <a:schemeClr val="lt1"/>
-                </a:solidFill>
-                <a:latin typeface="+mn-lt"/>
-                <a:ea typeface="+mn-ea"/>
-                <a:cs typeface="+mn-cs"/>
-              </a:defRPr>
-            </a:lvl1pPr>
-            <a:lvl2pPr marL="342900" algn="l" defTabSz="685800" rtl="0" eaLnBrk="1" latinLnBrk="0" hangingPunct="1">
-              <a:defRPr sz="1350" kern="1200">
-                <a:solidFill>
-                  <a:schemeClr val="lt1"/>
-                </a:solidFill>
-                <a:latin typeface="+mn-lt"/>
-                <a:ea typeface="+mn-ea"/>
-                <a:cs typeface="+mn-cs"/>
-              </a:defRPr>
-            </a:lvl2pPr>
-            <a:lvl3pPr marL="685800" algn="l" defTabSz="685800" rtl="0" eaLnBrk="1" latinLnBrk="0" hangingPunct="1">
-              <a:defRPr sz="1350" kern="1200">
-                <a:solidFill>
-                  <a:schemeClr val="lt1"/>
-                </a:solidFill>
-                <a:latin typeface="+mn-lt"/>
-                <a:ea typeface="+mn-ea"/>
-                <a:cs typeface="+mn-cs"/>
-              </a:defRPr>
-            </a:lvl3pPr>
-            <a:lvl4pPr marL="1028700" algn="l" defTabSz="685800" rtl="0" eaLnBrk="1" latinLnBrk="0" hangingPunct="1">
-              <a:defRPr sz="1350" kern="1200">
-                <a:solidFill>
-                  <a:schemeClr val="lt1"/>
-                </a:solidFill>
-                <a:latin typeface="+mn-lt"/>
-                <a:ea typeface="+mn-ea"/>
-                <a:cs typeface="+mn-cs"/>
-              </a:defRPr>
-            </a:lvl4pPr>
-            <a:lvl5pPr marL="1371600" algn="l" defTabSz="685800" rtl="0" eaLnBrk="1" latinLnBrk="0" hangingPunct="1">
-              <a:defRPr sz="1350" kern="1200">
-                <a:solidFill>
-                  <a:schemeClr val="lt1"/>
-                </a:solidFill>
-                <a:latin typeface="+mn-lt"/>
-                <a:ea typeface="+mn-ea"/>
-                <a:cs typeface="+mn-cs"/>
-              </a:defRPr>
-            </a:lvl5pPr>
-            <a:lvl6pPr marL="1714500" algn="l" defTabSz="685800" rtl="0" eaLnBrk="1" latinLnBrk="0" hangingPunct="1">
-              <a:defRPr sz="1350" kern="1200">
-                <a:solidFill>
-                  <a:schemeClr val="lt1"/>
-                </a:solidFill>
-                <a:latin typeface="+mn-lt"/>
-                <a:ea typeface="+mn-ea"/>
-                <a:cs typeface="+mn-cs"/>
-              </a:defRPr>
-            </a:lvl6pPr>
-            <a:lvl7pPr marL="2057400" algn="l" defTabSz="685800" rtl="0" eaLnBrk="1" latinLnBrk="0" hangingPunct="1">
-              <a:defRPr sz="1350" kern="1200">
-                <a:solidFill>
-                  <a:schemeClr val="lt1"/>
-                </a:solidFill>
-                <a:latin typeface="+mn-lt"/>
-                <a:ea typeface="+mn-ea"/>
-                <a:cs typeface="+mn-cs"/>
-              </a:defRPr>
-            </a:lvl7pPr>
-            <a:lvl8pPr marL="2400300" algn="l" defTabSz="685800" rtl="0" eaLnBrk="1" latinLnBrk="0" hangingPunct="1">
-              <a:defRPr sz="1350" kern="1200">
-                <a:solidFill>
-                  <a:schemeClr val="lt1"/>
-                </a:solidFill>
-                <a:latin typeface="+mn-lt"/>
-                <a:ea typeface="+mn-ea"/>
-                <a:cs typeface="+mn-cs"/>
-              </a:defRPr>
-            </a:lvl8pPr>
-            <a:lvl9pPr marL="2743200" algn="l" defTabSz="685800" rtl="0" eaLnBrk="1" latinLnBrk="0" hangingPunct="1">
-              <a:defRPr sz="1350" kern="1200">
-                <a:solidFill>
-                  <a:schemeClr val="lt1"/>
-                </a:solidFill>
-                <a:latin typeface="+mn-lt"/>
-                <a:ea typeface="+mn-ea"/>
-                <a:cs typeface="+mn-cs"/>
-              </a:defRPr>
-            </a:lvl9pPr>
-          </a:lstStyle>
-          <a:p>
-            <a:pPr algn="ctr"/>
-            <a:r>
-              <a:rPr lang="es-ES" altLang="zh-CN" sz="2000" dirty="0" smtClean="0">
-                <a:solidFill>
-                  <a:schemeClr val="bg1"/>
-                </a:solidFill>
-              </a:rPr>
-              <a:t>El usuario…</a:t>
-            </a:r>
-            <a:endParaRPr lang="zh-CN" altLang="en-US" sz="2000" dirty="0">
-              <a:solidFill>
-                <a:schemeClr val="bg1"/>
-              </a:solidFill>
-            </a:endParaRPr>
-          </a:p>
-        </p:txBody>
-      </p:sp>
       <p:pic>
         <p:nvPicPr>
           <p:cNvPr id="2050" name="Picture 2"/>
@@ -13891,15 +14903,67 @@
           <a:effectLst>
             <a:reflection blurRad="12700" stA="38000" endPos="28000" dist="5000" dir="5400000" sy="-100000" algn="bl" rotWithShape="0"/>
           </a:effectLst>
-          <a:extLst>
-            <a:ext uri="{909E8E84-426E-40DD-AFC4-6F175D3DCCD1}">
-              <a14:hiddenFill xmlns:a14="http://schemas.microsoft.com/office/drawing/2010/main">
-                <a:solidFill>
-                  <a:schemeClr val="accent1"/>
-                </a:solidFill>
-              </a14:hiddenFill>
-            </a:ext>
-          </a:extLst>
+          <a:extLst/>
+        </p:spPr>
+      </p:pic>
+      <p:pic>
+        <p:nvPicPr>
+          <p:cNvPr id="2" name="Imagen 1"/>
+          <p:cNvPicPr>
+            <a:picLocks noChangeAspect="1"/>
+          </p:cNvPicPr>
+          <p:nvPr/>
+        </p:nvPicPr>
+        <p:blipFill>
+          <a:blip r:embed="rId3">
+            <a:extLst>
+              <a:ext uri="{28A0092B-C50C-407E-A947-70E740481C1C}">
+                <a14:useLocalDpi xmlns:a14="http://schemas.microsoft.com/office/drawing/2010/main" val="0"/>
+              </a:ext>
+            </a:extLst>
+          </a:blip>
+          <a:stretch>
+            <a:fillRect/>
+          </a:stretch>
+        </p:blipFill>
+        <p:spPr>
+          <a:xfrm>
+            <a:off x="6329882" y="0"/>
+            <a:ext cx="1581371" cy="1895740"/>
+          </a:xfrm>
+          <a:prstGeom prst="rect">
+            <a:avLst/>
+          </a:prstGeom>
+        </p:spPr>
+      </p:pic>
+      <p:pic>
+        <p:nvPicPr>
+          <p:cNvPr id="3" name="Imagen 2"/>
+          <p:cNvPicPr>
+            <a:picLocks noChangeAspect="1"/>
+          </p:cNvPicPr>
+          <p:nvPr/>
+        </p:nvPicPr>
+        <p:blipFill>
+          <a:blip r:embed="rId4">
+            <a:extLst>
+              <a:ext uri="{28A0092B-C50C-407E-A947-70E740481C1C}">
+                <a14:useLocalDpi xmlns:a14="http://schemas.microsoft.com/office/drawing/2010/main" val="0"/>
+              </a:ext>
+            </a:extLst>
+          </a:blip>
+          <a:stretch>
+            <a:fillRect/>
+          </a:stretch>
+        </p:blipFill>
+        <p:spPr>
+          <a:xfrm>
+            <a:off x="7469675" y="2544319"/>
+            <a:ext cx="1505160" cy="1895740"/>
+          </a:xfrm>
+          <a:prstGeom prst="rect">
+            <a:avLst/>
+          </a:prstGeom>
         </p:spPr>
       </p:pic>
     </p:spTree>
@@ -13953,73 +15017,49 @@
       </p:grpSpPr>
       <p:sp>
         <p:nvSpPr>
-          <p:cNvPr id="34" name="Rectangle 33"/>
-          <p:cNvSpPr/>
-          <p:nvPr/>
+          <p:cNvPr id="2" name="Marcador de número de diapositiva 1"/>
+          <p:cNvSpPr>
+            <a:spLocks noGrp="1"/>
+          </p:cNvSpPr>
+          <p:nvPr>
+            <p:ph type="sldNum" sz="quarter" idx="12"/>
+          </p:nvPr>
         </p:nvSpPr>
-        <p:spPr>
-          <a:xfrm>
-            <a:off x="0" y="6115607"/>
-            <a:ext cx="12192000" cy="1047733"/>
-          </a:xfrm>
-          <a:prstGeom prst="rect">
-            <a:avLst/>
-          </a:prstGeom>
-          <a:solidFill>
-            <a:srgbClr val="D2D0D0"/>
-          </a:solidFill>
-          <a:ln>
-            <a:noFill/>
-          </a:ln>
-        </p:spPr>
-        <p:style>
-          <a:lnRef idx="2">
-            <a:schemeClr val="accent1">
-              <a:shade val="50000"/>
-            </a:schemeClr>
-          </a:lnRef>
-          <a:fillRef idx="1">
-            <a:schemeClr val="accent1"/>
-          </a:fillRef>
-          <a:effectRef idx="0">
-            <a:schemeClr val="accent1"/>
-          </a:effectRef>
-          <a:fontRef idx="minor">
-            <a:schemeClr val="lt1"/>
-          </a:fontRef>
-        </p:style>
+        <p:spPr/>
         <p:txBody>
-          <a:bodyPr rtlCol="0" anchor="ctr"/>
+          <a:bodyPr/>
           <a:lstStyle/>
           <a:p>
-            <a:pPr algn="ctr" fontAlgn="base">
-              <a:spcBef>
-                <a:spcPct val="0"/>
-              </a:spcBef>
-              <a:spcAft>
-                <a:spcPct val="0"/>
-              </a:spcAft>
-            </a:pPr>
-            <a:endParaRPr lang="en-US" sz="2800">
+            <a:fld id="{E16EE1C3-4C97-4D89-86D4-AB0FC9C35DCF}" type="slidenum">
+              <a:rPr lang="en-US" smtClean="0">
+                <a:solidFill>
+                  <a:srgbClr val="7E7E7E">
+                    <a:tint val="75000"/>
+                  </a:srgbClr>
+                </a:solidFill>
+              </a:rPr>
+              <a:t>6</a:t>
+            </a:fld>
+            <a:endParaRPr lang="en-US">
               <a:solidFill>
-                <a:prstClr val="white"/>
+                <a:srgbClr val="7E7E7E">
+                  <a:tint val="75000"/>
+                </a:srgbClr>
               </a:solidFill>
-              <a:cs typeface="+mn-ea"/>
-              <a:sym typeface="+mn-lt"/>
             </a:endParaRPr>
           </a:p>
         </p:txBody>
       </p:sp>
       <p:sp>
         <p:nvSpPr>
-          <p:cNvPr id="10" name="箭头: V 形 105"/>
+          <p:cNvPr id="3" name="箭头: V 形 105"/>
           <p:cNvSpPr/>
           <p:nvPr/>
         </p:nvSpPr>
         <p:spPr>
           <a:xfrm flipH="1">
-            <a:off x="7250197" y="5279409"/>
-            <a:ext cx="4941803" cy="1028161"/>
+            <a:off x="5697187" y="360021"/>
+            <a:ext cx="5826825" cy="1611998"/>
           </a:xfrm>
           <a:prstGeom prst="chevron">
             <a:avLst>
@@ -14167,7 +15207,7 @@
                   <a:schemeClr val="bg1"/>
                 </a:solidFill>
               </a:rPr>
-              <a:t>El usuario…</a:t>
+              <a:t>El será capaz de realizar el registro de vehículos para que aparezcan en la pagina web y sean visibles para los clientes detallando todas las características posibles</a:t>
             </a:r>
             <a:endParaRPr lang="zh-CN" altLang="en-US" sz="2000" dirty="0">
               <a:solidFill>
@@ -14177,68 +15217,527 @@
           </a:p>
         </p:txBody>
       </p:sp>
-      <p:pic>
-        <p:nvPicPr>
-          <p:cNvPr id="3075" name="Picture 3"/>
-          <p:cNvPicPr>
-            <a:picLocks noChangeAspect="1" noChangeArrowheads="1"/>
-          </p:cNvPicPr>
+      <p:sp>
+        <p:nvSpPr>
+          <p:cNvPr id="4" name="箭头: V 形 105"/>
+          <p:cNvSpPr/>
           <p:nvPr/>
-        </p:nvPicPr>
-        <p:blipFill>
-          <a:blip r:embed="rId2">
-            <a:extLst>
-              <a:ext uri="{28A0092B-C50C-407E-A947-70E740481C1C}">
-                <a14:useLocalDpi xmlns:a14="http://schemas.microsoft.com/office/drawing/2010/main" val="0"/>
-              </a:ext>
-            </a:extLst>
-          </a:blip>
-          <a:srcRect/>
-          <a:stretch>
-            <a:fillRect/>
-          </a:stretch>
-        </p:blipFill>
-        <p:spPr bwMode="auto">
-          <a:xfrm>
-            <a:off x="476250" y="152464"/>
-            <a:ext cx="5981700" cy="6610285"/>
+        </p:nvSpPr>
+        <p:spPr>
+          <a:xfrm flipH="1">
+            <a:off x="287536" y="275914"/>
+            <a:ext cx="5233750" cy="1696105"/>
           </a:xfrm>
-          <a:prstGeom prst="roundRect">
+          <a:prstGeom prst="chevron">
             <a:avLst>
-              <a:gd name="adj" fmla="val 8594"/>
+              <a:gd name="adj" fmla="val 29021"/>
             </a:avLst>
           </a:prstGeom>
-          <a:solidFill>
-            <a:srgbClr val="FFFFFF">
-              <a:shade val="85000"/>
-            </a:srgbClr>
-          </a:solidFill>
-          <a:ln w="9525">
-            <a:solidFill>
-              <a:schemeClr val="tx1"/>
-            </a:solidFill>
-            <a:miter lim="800000"/>
-            <a:headEnd/>
-            <a:tailEnd/>
+          <a:gradFill flip="none" rotWithShape="1">
+            <a:gsLst>
+              <a:gs pos="0">
+                <a:srgbClr val="F9AC7D"/>
+              </a:gs>
+              <a:gs pos="100000">
+                <a:srgbClr val="F28893"/>
+              </a:gs>
+            </a:gsLst>
+            <a:lin ang="0" scaled="1"/>
+            <a:tileRect/>
+          </a:gradFill>
+          <a:ln>
+            <a:noFill/>
           </a:ln>
-          <a:effectLst>
-            <a:reflection blurRad="12700" stA="38000" endPos="28000" dist="5000" dir="5400000" sy="-100000" algn="bl" rotWithShape="0"/>
-          </a:effectLst>
-          <a:extLst>
-            <a:ext uri="{909E8E84-426E-40DD-AFC4-6F175D3DCCD1}">
-              <a14:hiddenFill xmlns:a14="http://schemas.microsoft.com/office/drawing/2010/main">
-                <a:solidFill>
-                  <a:schemeClr val="accent1"/>
-                </a:solidFill>
-              </a14:hiddenFill>
-            </a:ext>
-          </a:extLst>
         </p:spPr>
-      </p:pic>
+        <p:style>
+          <a:lnRef idx="2">
+            <a:schemeClr val="accent1">
+              <a:shade val="50000"/>
+            </a:schemeClr>
+          </a:lnRef>
+          <a:fillRef idx="1">
+            <a:schemeClr val="accent1"/>
+          </a:fillRef>
+          <a:effectRef idx="0">
+            <a:schemeClr val="accent1"/>
+          </a:effectRef>
+          <a:fontRef idx="minor">
+            <a:schemeClr val="lt1"/>
+          </a:fontRef>
+        </p:style>
+        <p:txBody>
+          <a:bodyPr rtlCol="0" anchor="ctr"/>
+          <a:lstStyle>
+            <a:defPPr>
+              <a:defRPr lang="en-US">
+                <a:solidFill>
+                  <a:schemeClr val="lt1"/>
+                </a:solidFill>
+              </a:defRPr>
+            </a:defPPr>
+            <a:lvl1pPr marL="0" algn="l" defTabSz="685800" rtl="0" eaLnBrk="1" latinLnBrk="0" hangingPunct="1">
+              <a:defRPr sz="1350" kern="1200">
+                <a:solidFill>
+                  <a:schemeClr val="lt1"/>
+                </a:solidFill>
+                <a:latin typeface="+mn-lt"/>
+                <a:ea typeface="+mn-ea"/>
+                <a:cs typeface="+mn-cs"/>
+              </a:defRPr>
+            </a:lvl1pPr>
+            <a:lvl2pPr marL="342900" algn="l" defTabSz="685800" rtl="0" eaLnBrk="1" latinLnBrk="0" hangingPunct="1">
+              <a:defRPr sz="1350" kern="1200">
+                <a:solidFill>
+                  <a:schemeClr val="lt1"/>
+                </a:solidFill>
+                <a:latin typeface="+mn-lt"/>
+                <a:ea typeface="+mn-ea"/>
+                <a:cs typeface="+mn-cs"/>
+              </a:defRPr>
+            </a:lvl2pPr>
+            <a:lvl3pPr marL="685800" algn="l" defTabSz="685800" rtl="0" eaLnBrk="1" latinLnBrk="0" hangingPunct="1">
+              <a:defRPr sz="1350" kern="1200">
+                <a:solidFill>
+                  <a:schemeClr val="lt1"/>
+                </a:solidFill>
+                <a:latin typeface="+mn-lt"/>
+                <a:ea typeface="+mn-ea"/>
+                <a:cs typeface="+mn-cs"/>
+              </a:defRPr>
+            </a:lvl3pPr>
+            <a:lvl4pPr marL="1028700" algn="l" defTabSz="685800" rtl="0" eaLnBrk="1" latinLnBrk="0" hangingPunct="1">
+              <a:defRPr sz="1350" kern="1200">
+                <a:solidFill>
+                  <a:schemeClr val="lt1"/>
+                </a:solidFill>
+                <a:latin typeface="+mn-lt"/>
+                <a:ea typeface="+mn-ea"/>
+                <a:cs typeface="+mn-cs"/>
+              </a:defRPr>
+            </a:lvl4pPr>
+            <a:lvl5pPr marL="1371600" algn="l" defTabSz="685800" rtl="0" eaLnBrk="1" latinLnBrk="0" hangingPunct="1">
+              <a:defRPr sz="1350" kern="1200">
+                <a:solidFill>
+                  <a:schemeClr val="lt1"/>
+                </a:solidFill>
+                <a:latin typeface="+mn-lt"/>
+                <a:ea typeface="+mn-ea"/>
+                <a:cs typeface="+mn-cs"/>
+              </a:defRPr>
+            </a:lvl5pPr>
+            <a:lvl6pPr marL="1714500" algn="l" defTabSz="685800" rtl="0" eaLnBrk="1" latinLnBrk="0" hangingPunct="1">
+              <a:defRPr sz="1350" kern="1200">
+                <a:solidFill>
+                  <a:schemeClr val="lt1"/>
+                </a:solidFill>
+                <a:latin typeface="+mn-lt"/>
+                <a:ea typeface="+mn-ea"/>
+                <a:cs typeface="+mn-cs"/>
+              </a:defRPr>
+            </a:lvl6pPr>
+            <a:lvl7pPr marL="2057400" algn="l" defTabSz="685800" rtl="0" eaLnBrk="1" latinLnBrk="0" hangingPunct="1">
+              <a:defRPr sz="1350" kern="1200">
+                <a:solidFill>
+                  <a:schemeClr val="lt1"/>
+                </a:solidFill>
+                <a:latin typeface="+mn-lt"/>
+                <a:ea typeface="+mn-ea"/>
+                <a:cs typeface="+mn-cs"/>
+              </a:defRPr>
+            </a:lvl7pPr>
+            <a:lvl8pPr marL="2400300" algn="l" defTabSz="685800" rtl="0" eaLnBrk="1" latinLnBrk="0" hangingPunct="1">
+              <a:defRPr sz="1350" kern="1200">
+                <a:solidFill>
+                  <a:schemeClr val="lt1"/>
+                </a:solidFill>
+                <a:latin typeface="+mn-lt"/>
+                <a:ea typeface="+mn-ea"/>
+                <a:cs typeface="+mn-cs"/>
+              </a:defRPr>
+            </a:lvl8pPr>
+            <a:lvl9pPr marL="2743200" algn="l" defTabSz="685800" rtl="0" eaLnBrk="1" latinLnBrk="0" hangingPunct="1">
+              <a:defRPr sz="1350" kern="1200">
+                <a:solidFill>
+                  <a:schemeClr val="lt1"/>
+                </a:solidFill>
+                <a:latin typeface="+mn-lt"/>
+                <a:ea typeface="+mn-ea"/>
+                <a:cs typeface="+mn-cs"/>
+              </a:defRPr>
+            </a:lvl9pPr>
+          </a:lstStyle>
+          <a:p>
+            <a:pPr algn="ctr"/>
+            <a:r>
+              <a:rPr lang="es-ES" altLang="zh-CN" sz="2000" dirty="0" smtClean="0">
+                <a:solidFill>
+                  <a:schemeClr val="bg1"/>
+                </a:solidFill>
+              </a:rPr>
+              <a:t>La tabla de agencia estarán los datos generales de las distintas agencias de rentas de vehículos con las que se tiene convenio </a:t>
+            </a:r>
+            <a:endParaRPr lang="zh-CN" altLang="en-US" sz="2000" dirty="0">
+              <a:solidFill>
+                <a:schemeClr val="bg1"/>
+              </a:solidFill>
+            </a:endParaRPr>
+          </a:p>
+        </p:txBody>
+      </p:sp>
+      <p:sp>
+        <p:nvSpPr>
+          <p:cNvPr id="5" name="箭头: V 形 105"/>
+          <p:cNvSpPr/>
+          <p:nvPr/>
+        </p:nvSpPr>
+        <p:spPr>
+          <a:xfrm flipH="1">
+            <a:off x="153497" y="2411350"/>
+            <a:ext cx="5233750" cy="1696105"/>
+          </a:xfrm>
+          <a:prstGeom prst="chevron">
+            <a:avLst>
+              <a:gd name="adj" fmla="val 29021"/>
+            </a:avLst>
+          </a:prstGeom>
+          <a:gradFill flip="none" rotWithShape="1">
+            <a:gsLst>
+              <a:gs pos="0">
+                <a:srgbClr val="F9AC7D"/>
+              </a:gs>
+              <a:gs pos="100000">
+                <a:srgbClr val="F28893"/>
+              </a:gs>
+            </a:gsLst>
+            <a:lin ang="0" scaled="1"/>
+            <a:tileRect/>
+          </a:gradFill>
+          <a:ln>
+            <a:noFill/>
+          </a:ln>
+        </p:spPr>
+        <p:style>
+          <a:lnRef idx="2">
+            <a:schemeClr val="accent1">
+              <a:shade val="50000"/>
+            </a:schemeClr>
+          </a:lnRef>
+          <a:fillRef idx="1">
+            <a:schemeClr val="accent1"/>
+          </a:fillRef>
+          <a:effectRef idx="0">
+            <a:schemeClr val="accent1"/>
+          </a:effectRef>
+          <a:fontRef idx="minor">
+            <a:schemeClr val="lt1"/>
+          </a:fontRef>
+        </p:style>
+        <p:txBody>
+          <a:bodyPr rtlCol="0" anchor="ctr"/>
+          <a:lstStyle>
+            <a:defPPr>
+              <a:defRPr lang="en-US">
+                <a:solidFill>
+                  <a:schemeClr val="lt1"/>
+                </a:solidFill>
+              </a:defRPr>
+            </a:defPPr>
+            <a:lvl1pPr marL="0" algn="l" defTabSz="685800" rtl="0" eaLnBrk="1" latinLnBrk="0" hangingPunct="1">
+              <a:defRPr sz="1350" kern="1200">
+                <a:solidFill>
+                  <a:schemeClr val="lt1"/>
+                </a:solidFill>
+                <a:latin typeface="+mn-lt"/>
+                <a:ea typeface="+mn-ea"/>
+                <a:cs typeface="+mn-cs"/>
+              </a:defRPr>
+            </a:lvl1pPr>
+            <a:lvl2pPr marL="342900" algn="l" defTabSz="685800" rtl="0" eaLnBrk="1" latinLnBrk="0" hangingPunct="1">
+              <a:defRPr sz="1350" kern="1200">
+                <a:solidFill>
+                  <a:schemeClr val="lt1"/>
+                </a:solidFill>
+                <a:latin typeface="+mn-lt"/>
+                <a:ea typeface="+mn-ea"/>
+                <a:cs typeface="+mn-cs"/>
+              </a:defRPr>
+            </a:lvl2pPr>
+            <a:lvl3pPr marL="685800" algn="l" defTabSz="685800" rtl="0" eaLnBrk="1" latinLnBrk="0" hangingPunct="1">
+              <a:defRPr sz="1350" kern="1200">
+                <a:solidFill>
+                  <a:schemeClr val="lt1"/>
+                </a:solidFill>
+                <a:latin typeface="+mn-lt"/>
+                <a:ea typeface="+mn-ea"/>
+                <a:cs typeface="+mn-cs"/>
+              </a:defRPr>
+            </a:lvl3pPr>
+            <a:lvl4pPr marL="1028700" algn="l" defTabSz="685800" rtl="0" eaLnBrk="1" latinLnBrk="0" hangingPunct="1">
+              <a:defRPr sz="1350" kern="1200">
+                <a:solidFill>
+                  <a:schemeClr val="lt1"/>
+                </a:solidFill>
+                <a:latin typeface="+mn-lt"/>
+                <a:ea typeface="+mn-ea"/>
+                <a:cs typeface="+mn-cs"/>
+              </a:defRPr>
+            </a:lvl4pPr>
+            <a:lvl5pPr marL="1371600" algn="l" defTabSz="685800" rtl="0" eaLnBrk="1" latinLnBrk="0" hangingPunct="1">
+              <a:defRPr sz="1350" kern="1200">
+                <a:solidFill>
+                  <a:schemeClr val="lt1"/>
+                </a:solidFill>
+                <a:latin typeface="+mn-lt"/>
+                <a:ea typeface="+mn-ea"/>
+                <a:cs typeface="+mn-cs"/>
+              </a:defRPr>
+            </a:lvl5pPr>
+            <a:lvl6pPr marL="1714500" algn="l" defTabSz="685800" rtl="0" eaLnBrk="1" latinLnBrk="0" hangingPunct="1">
+              <a:defRPr sz="1350" kern="1200">
+                <a:solidFill>
+                  <a:schemeClr val="lt1"/>
+                </a:solidFill>
+                <a:latin typeface="+mn-lt"/>
+                <a:ea typeface="+mn-ea"/>
+                <a:cs typeface="+mn-cs"/>
+              </a:defRPr>
+            </a:lvl6pPr>
+            <a:lvl7pPr marL="2057400" algn="l" defTabSz="685800" rtl="0" eaLnBrk="1" latinLnBrk="0" hangingPunct="1">
+              <a:defRPr sz="1350" kern="1200">
+                <a:solidFill>
+                  <a:schemeClr val="lt1"/>
+                </a:solidFill>
+                <a:latin typeface="+mn-lt"/>
+                <a:ea typeface="+mn-ea"/>
+                <a:cs typeface="+mn-cs"/>
+              </a:defRPr>
+            </a:lvl7pPr>
+            <a:lvl8pPr marL="2400300" algn="l" defTabSz="685800" rtl="0" eaLnBrk="1" latinLnBrk="0" hangingPunct="1">
+              <a:defRPr sz="1350" kern="1200">
+                <a:solidFill>
+                  <a:schemeClr val="lt1"/>
+                </a:solidFill>
+                <a:latin typeface="+mn-lt"/>
+                <a:ea typeface="+mn-ea"/>
+                <a:cs typeface="+mn-cs"/>
+              </a:defRPr>
+            </a:lvl8pPr>
+            <a:lvl9pPr marL="2743200" algn="l" defTabSz="685800" rtl="0" eaLnBrk="1" latinLnBrk="0" hangingPunct="1">
+              <a:defRPr sz="1350" kern="1200">
+                <a:solidFill>
+                  <a:schemeClr val="lt1"/>
+                </a:solidFill>
+                <a:latin typeface="+mn-lt"/>
+                <a:ea typeface="+mn-ea"/>
+                <a:cs typeface="+mn-cs"/>
+              </a:defRPr>
+            </a:lvl9pPr>
+          </a:lstStyle>
+          <a:p>
+            <a:pPr algn="ctr"/>
+            <a:r>
+              <a:rPr lang="es-ES" altLang="zh-CN" sz="2000" dirty="0" smtClean="0">
+                <a:solidFill>
+                  <a:schemeClr val="bg1"/>
+                </a:solidFill>
+              </a:rPr>
+              <a:t>Además de eso el vehículo llevara un </a:t>
+            </a:r>
+            <a:r>
+              <a:rPr lang="es-ES" altLang="zh-CN" sz="2000" dirty="0" err="1" smtClean="0">
+                <a:solidFill>
+                  <a:schemeClr val="bg1"/>
+                </a:solidFill>
+              </a:rPr>
+              <a:t>recod</a:t>
+            </a:r>
+            <a:r>
+              <a:rPr lang="es-ES" altLang="zh-CN" sz="2000" dirty="0" smtClean="0">
+                <a:solidFill>
+                  <a:schemeClr val="bg1"/>
+                </a:solidFill>
+              </a:rPr>
+              <a:t> de todos los mantenimientos que se le han efectuado y si esta disponible o no</a:t>
+            </a:r>
+            <a:endParaRPr lang="zh-CN" altLang="en-US" sz="2000" dirty="0">
+              <a:solidFill>
+                <a:schemeClr val="bg1"/>
+              </a:solidFill>
+            </a:endParaRPr>
+          </a:p>
+        </p:txBody>
+      </p:sp>
+      <p:sp>
+        <p:nvSpPr>
+          <p:cNvPr id="6" name="箭头: V 形 105"/>
+          <p:cNvSpPr/>
+          <p:nvPr/>
+        </p:nvSpPr>
+        <p:spPr>
+          <a:xfrm flipH="1">
+            <a:off x="5993724" y="2411350"/>
+            <a:ext cx="5233750" cy="1696105"/>
+          </a:xfrm>
+          <a:prstGeom prst="chevron">
+            <a:avLst>
+              <a:gd name="adj" fmla="val 29021"/>
+            </a:avLst>
+          </a:prstGeom>
+          <a:gradFill flip="none" rotWithShape="1">
+            <a:gsLst>
+              <a:gs pos="0">
+                <a:srgbClr val="F9AC7D"/>
+              </a:gs>
+              <a:gs pos="100000">
+                <a:srgbClr val="F28893"/>
+              </a:gs>
+            </a:gsLst>
+            <a:lin ang="0" scaled="1"/>
+            <a:tileRect/>
+          </a:gradFill>
+          <a:ln>
+            <a:noFill/>
+          </a:ln>
+        </p:spPr>
+        <p:style>
+          <a:lnRef idx="2">
+            <a:schemeClr val="accent1">
+              <a:shade val="50000"/>
+            </a:schemeClr>
+          </a:lnRef>
+          <a:fillRef idx="1">
+            <a:schemeClr val="accent1"/>
+          </a:fillRef>
+          <a:effectRef idx="0">
+            <a:schemeClr val="accent1"/>
+          </a:effectRef>
+          <a:fontRef idx="minor">
+            <a:schemeClr val="lt1"/>
+          </a:fontRef>
+        </p:style>
+        <p:txBody>
+          <a:bodyPr rtlCol="0" anchor="ctr"/>
+          <a:lstStyle>
+            <a:defPPr>
+              <a:defRPr lang="en-US">
+                <a:solidFill>
+                  <a:schemeClr val="lt1"/>
+                </a:solidFill>
+              </a:defRPr>
+            </a:defPPr>
+            <a:lvl1pPr marL="0" algn="l" defTabSz="685800" rtl="0" eaLnBrk="1" latinLnBrk="0" hangingPunct="1">
+              <a:defRPr sz="1350" kern="1200">
+                <a:solidFill>
+                  <a:schemeClr val="lt1"/>
+                </a:solidFill>
+                <a:latin typeface="+mn-lt"/>
+                <a:ea typeface="+mn-ea"/>
+                <a:cs typeface="+mn-cs"/>
+              </a:defRPr>
+            </a:lvl1pPr>
+            <a:lvl2pPr marL="342900" algn="l" defTabSz="685800" rtl="0" eaLnBrk="1" latinLnBrk="0" hangingPunct="1">
+              <a:defRPr sz="1350" kern="1200">
+                <a:solidFill>
+                  <a:schemeClr val="lt1"/>
+                </a:solidFill>
+                <a:latin typeface="+mn-lt"/>
+                <a:ea typeface="+mn-ea"/>
+                <a:cs typeface="+mn-cs"/>
+              </a:defRPr>
+            </a:lvl2pPr>
+            <a:lvl3pPr marL="685800" algn="l" defTabSz="685800" rtl="0" eaLnBrk="1" latinLnBrk="0" hangingPunct="1">
+              <a:defRPr sz="1350" kern="1200">
+                <a:solidFill>
+                  <a:schemeClr val="lt1"/>
+                </a:solidFill>
+                <a:latin typeface="+mn-lt"/>
+                <a:ea typeface="+mn-ea"/>
+                <a:cs typeface="+mn-cs"/>
+              </a:defRPr>
+            </a:lvl3pPr>
+            <a:lvl4pPr marL="1028700" algn="l" defTabSz="685800" rtl="0" eaLnBrk="1" latinLnBrk="0" hangingPunct="1">
+              <a:defRPr sz="1350" kern="1200">
+                <a:solidFill>
+                  <a:schemeClr val="lt1"/>
+                </a:solidFill>
+                <a:latin typeface="+mn-lt"/>
+                <a:ea typeface="+mn-ea"/>
+                <a:cs typeface="+mn-cs"/>
+              </a:defRPr>
+            </a:lvl4pPr>
+            <a:lvl5pPr marL="1371600" algn="l" defTabSz="685800" rtl="0" eaLnBrk="1" latinLnBrk="0" hangingPunct="1">
+              <a:defRPr sz="1350" kern="1200">
+                <a:solidFill>
+                  <a:schemeClr val="lt1"/>
+                </a:solidFill>
+                <a:latin typeface="+mn-lt"/>
+                <a:ea typeface="+mn-ea"/>
+                <a:cs typeface="+mn-cs"/>
+              </a:defRPr>
+            </a:lvl5pPr>
+            <a:lvl6pPr marL="1714500" algn="l" defTabSz="685800" rtl="0" eaLnBrk="1" latinLnBrk="0" hangingPunct="1">
+              <a:defRPr sz="1350" kern="1200">
+                <a:solidFill>
+                  <a:schemeClr val="lt1"/>
+                </a:solidFill>
+                <a:latin typeface="+mn-lt"/>
+                <a:ea typeface="+mn-ea"/>
+                <a:cs typeface="+mn-cs"/>
+              </a:defRPr>
+            </a:lvl6pPr>
+            <a:lvl7pPr marL="2057400" algn="l" defTabSz="685800" rtl="0" eaLnBrk="1" latinLnBrk="0" hangingPunct="1">
+              <a:defRPr sz="1350" kern="1200">
+                <a:solidFill>
+                  <a:schemeClr val="lt1"/>
+                </a:solidFill>
+                <a:latin typeface="+mn-lt"/>
+                <a:ea typeface="+mn-ea"/>
+                <a:cs typeface="+mn-cs"/>
+              </a:defRPr>
+            </a:lvl7pPr>
+            <a:lvl8pPr marL="2400300" algn="l" defTabSz="685800" rtl="0" eaLnBrk="1" latinLnBrk="0" hangingPunct="1">
+              <a:defRPr sz="1350" kern="1200">
+                <a:solidFill>
+                  <a:schemeClr val="lt1"/>
+                </a:solidFill>
+                <a:latin typeface="+mn-lt"/>
+                <a:ea typeface="+mn-ea"/>
+                <a:cs typeface="+mn-cs"/>
+              </a:defRPr>
+            </a:lvl8pPr>
+            <a:lvl9pPr marL="2743200" algn="l" defTabSz="685800" rtl="0" eaLnBrk="1" latinLnBrk="0" hangingPunct="1">
+              <a:defRPr sz="1350" kern="1200">
+                <a:solidFill>
+                  <a:schemeClr val="lt1"/>
+                </a:solidFill>
+                <a:latin typeface="+mn-lt"/>
+                <a:ea typeface="+mn-ea"/>
+                <a:cs typeface="+mn-cs"/>
+              </a:defRPr>
+            </a:lvl9pPr>
+          </a:lstStyle>
+          <a:p>
+            <a:pPr algn="ctr"/>
+            <a:r>
+              <a:rPr lang="es-ES" altLang="zh-CN" sz="2000" dirty="0" smtClean="0">
+                <a:solidFill>
+                  <a:schemeClr val="bg1"/>
+                </a:solidFill>
+              </a:rPr>
+              <a:t>El cliente será capaz de rentar el vehículo que desee y que este disponible </a:t>
+            </a:r>
+            <a:endParaRPr lang="zh-CN" altLang="en-US" sz="2000" dirty="0">
+              <a:solidFill>
+                <a:schemeClr val="bg1"/>
+              </a:solidFill>
+            </a:endParaRPr>
+          </a:p>
+        </p:txBody>
+      </p:sp>
     </p:spTree>
     <p:extLst>
       <p:ext uri="{BB962C8B-B14F-4D97-AF65-F5344CB8AC3E}">
-        <p14:creationId xmlns:p14="http://schemas.microsoft.com/office/powerpoint/2010/main" val="1970214700"/>
+        <p14:creationId xmlns:p14="http://schemas.microsoft.com/office/powerpoint/2010/main" val="2323609180"/>
       </p:ext>
     </p:extLst>
   </p:cSld>
@@ -14257,13 +15756,6 @@
       </p:transition>
     </mc:Fallback>
   </mc:AlternateContent>
-  <p:timing>
-    <p:tnLst>
-      <p:par>
-        <p:cTn id="1" dur="indefinite" restart="never" nodeType="tmRoot"/>
-      </p:par>
-    </p:tnLst>
-  </p:timing>
 </p:sld>
 </file>
 
@@ -14351,8 +15843,8 @@
         </p:nvSpPr>
         <p:spPr>
           <a:xfrm flipH="1">
-            <a:off x="7250197" y="5279409"/>
-            <a:ext cx="4941803" cy="1028161"/>
+            <a:off x="6589182" y="53311"/>
+            <a:ext cx="4941803" cy="640750"/>
           </a:xfrm>
           <a:prstGeom prst="chevron">
             <a:avLst>
@@ -14500,7 +15992,15 @@
                   <a:schemeClr val="bg1"/>
                 </a:solidFill>
               </a:rPr>
-              <a:t>El usuario…</a:t>
+              <a:t>El </a:t>
+            </a:r>
+            <a:r>
+              <a:rPr lang="es-ES" altLang="zh-CN" sz="2000" dirty="0" smtClean="0">
+                <a:solidFill>
+                  <a:schemeClr val="bg1"/>
+                </a:solidFill>
+              </a:rPr>
+              <a:t>usuario será capaz de realizar una o muchas encomiendas</a:t>
             </a:r>
             <a:endParaRPr lang="zh-CN" altLang="en-US" sz="2000" dirty="0">
               <a:solidFill>
@@ -14512,7 +16012,7 @@
       </p:sp>
       <p:pic>
         <p:nvPicPr>
-          <p:cNvPr id="4098" name="Picture 2"/>
+          <p:cNvPr id="3075" name="Picture 3"/>
           <p:cNvPicPr>
             <a:picLocks noChangeAspect="1" noChangeArrowheads="1"/>
           </p:cNvPicPr>
@@ -14533,8 +16033,8 @@
         </p:blipFill>
         <p:spPr bwMode="auto">
           <a:xfrm>
-            <a:off x="471488" y="290059"/>
-            <a:ext cx="6058459" cy="6569961"/>
+            <a:off x="476250" y="152464"/>
+            <a:ext cx="5981700" cy="6610285"/>
           </a:xfrm>
           <a:prstGeom prst="roundRect">
             <a:avLst>
@@ -14557,21 +16057,697 @@
           <a:effectLst>
             <a:reflection blurRad="12700" stA="38000" endPos="28000" dist="5000" dir="5400000" sy="-100000" algn="bl" rotWithShape="0"/>
           </a:effectLst>
-          <a:extLst>
-            <a:ext uri="{909E8E84-426E-40DD-AFC4-6F175D3DCCD1}">
-              <a14:hiddenFill xmlns:a14="http://schemas.microsoft.com/office/drawing/2010/main">
-                <a:solidFill>
-                  <a:schemeClr val="accent1"/>
-                </a:solidFill>
-              </a14:hiddenFill>
-            </a:ext>
-          </a:extLst>
+          <a:extLst/>
         </p:spPr>
       </p:pic>
+      <p:sp>
+        <p:nvSpPr>
+          <p:cNvPr id="5" name="箭头: V 形 105"/>
+          <p:cNvSpPr/>
+          <p:nvPr/>
+        </p:nvSpPr>
+        <p:spPr>
+          <a:xfrm flipH="1">
+            <a:off x="6457950" y="733241"/>
+            <a:ext cx="5734048" cy="1040473"/>
+          </a:xfrm>
+          <a:prstGeom prst="chevron">
+            <a:avLst>
+              <a:gd name="adj" fmla="val 29021"/>
+            </a:avLst>
+          </a:prstGeom>
+          <a:gradFill flip="none" rotWithShape="1">
+            <a:gsLst>
+              <a:gs pos="0">
+                <a:srgbClr val="F9AC7D"/>
+              </a:gs>
+              <a:gs pos="100000">
+                <a:srgbClr val="F28893"/>
+              </a:gs>
+            </a:gsLst>
+            <a:lin ang="0" scaled="1"/>
+            <a:tileRect/>
+          </a:gradFill>
+          <a:ln>
+            <a:noFill/>
+          </a:ln>
+        </p:spPr>
+        <p:style>
+          <a:lnRef idx="2">
+            <a:schemeClr val="accent1">
+              <a:shade val="50000"/>
+            </a:schemeClr>
+          </a:lnRef>
+          <a:fillRef idx="1">
+            <a:schemeClr val="accent1"/>
+          </a:fillRef>
+          <a:effectRef idx="0">
+            <a:schemeClr val="accent1"/>
+          </a:effectRef>
+          <a:fontRef idx="minor">
+            <a:schemeClr val="lt1"/>
+          </a:fontRef>
+        </p:style>
+        <p:txBody>
+          <a:bodyPr rtlCol="0" anchor="ctr"/>
+          <a:lstStyle>
+            <a:defPPr>
+              <a:defRPr lang="en-US">
+                <a:solidFill>
+                  <a:schemeClr val="lt1"/>
+                </a:solidFill>
+              </a:defRPr>
+            </a:defPPr>
+            <a:lvl1pPr marL="0" algn="l" defTabSz="685800" rtl="0" eaLnBrk="1" latinLnBrk="0" hangingPunct="1">
+              <a:defRPr sz="1350" kern="1200">
+                <a:solidFill>
+                  <a:schemeClr val="lt1"/>
+                </a:solidFill>
+                <a:latin typeface="+mn-lt"/>
+                <a:ea typeface="+mn-ea"/>
+                <a:cs typeface="+mn-cs"/>
+              </a:defRPr>
+            </a:lvl1pPr>
+            <a:lvl2pPr marL="342900" algn="l" defTabSz="685800" rtl="0" eaLnBrk="1" latinLnBrk="0" hangingPunct="1">
+              <a:defRPr sz="1350" kern="1200">
+                <a:solidFill>
+                  <a:schemeClr val="lt1"/>
+                </a:solidFill>
+                <a:latin typeface="+mn-lt"/>
+                <a:ea typeface="+mn-ea"/>
+                <a:cs typeface="+mn-cs"/>
+              </a:defRPr>
+            </a:lvl2pPr>
+            <a:lvl3pPr marL="685800" algn="l" defTabSz="685800" rtl="0" eaLnBrk="1" latinLnBrk="0" hangingPunct="1">
+              <a:defRPr sz="1350" kern="1200">
+                <a:solidFill>
+                  <a:schemeClr val="lt1"/>
+                </a:solidFill>
+                <a:latin typeface="+mn-lt"/>
+                <a:ea typeface="+mn-ea"/>
+                <a:cs typeface="+mn-cs"/>
+              </a:defRPr>
+            </a:lvl3pPr>
+            <a:lvl4pPr marL="1028700" algn="l" defTabSz="685800" rtl="0" eaLnBrk="1" latinLnBrk="0" hangingPunct="1">
+              <a:defRPr sz="1350" kern="1200">
+                <a:solidFill>
+                  <a:schemeClr val="lt1"/>
+                </a:solidFill>
+                <a:latin typeface="+mn-lt"/>
+                <a:ea typeface="+mn-ea"/>
+                <a:cs typeface="+mn-cs"/>
+              </a:defRPr>
+            </a:lvl4pPr>
+            <a:lvl5pPr marL="1371600" algn="l" defTabSz="685800" rtl="0" eaLnBrk="1" latinLnBrk="0" hangingPunct="1">
+              <a:defRPr sz="1350" kern="1200">
+                <a:solidFill>
+                  <a:schemeClr val="lt1"/>
+                </a:solidFill>
+                <a:latin typeface="+mn-lt"/>
+                <a:ea typeface="+mn-ea"/>
+                <a:cs typeface="+mn-cs"/>
+              </a:defRPr>
+            </a:lvl5pPr>
+            <a:lvl6pPr marL="1714500" algn="l" defTabSz="685800" rtl="0" eaLnBrk="1" latinLnBrk="0" hangingPunct="1">
+              <a:defRPr sz="1350" kern="1200">
+                <a:solidFill>
+                  <a:schemeClr val="lt1"/>
+                </a:solidFill>
+                <a:latin typeface="+mn-lt"/>
+                <a:ea typeface="+mn-ea"/>
+                <a:cs typeface="+mn-cs"/>
+              </a:defRPr>
+            </a:lvl6pPr>
+            <a:lvl7pPr marL="2057400" algn="l" defTabSz="685800" rtl="0" eaLnBrk="1" latinLnBrk="0" hangingPunct="1">
+              <a:defRPr sz="1350" kern="1200">
+                <a:solidFill>
+                  <a:schemeClr val="lt1"/>
+                </a:solidFill>
+                <a:latin typeface="+mn-lt"/>
+                <a:ea typeface="+mn-ea"/>
+                <a:cs typeface="+mn-cs"/>
+              </a:defRPr>
+            </a:lvl7pPr>
+            <a:lvl8pPr marL="2400300" algn="l" defTabSz="685800" rtl="0" eaLnBrk="1" latinLnBrk="0" hangingPunct="1">
+              <a:defRPr sz="1350" kern="1200">
+                <a:solidFill>
+                  <a:schemeClr val="lt1"/>
+                </a:solidFill>
+                <a:latin typeface="+mn-lt"/>
+                <a:ea typeface="+mn-ea"/>
+                <a:cs typeface="+mn-cs"/>
+              </a:defRPr>
+            </a:lvl8pPr>
+            <a:lvl9pPr marL="2743200" algn="l" defTabSz="685800" rtl="0" eaLnBrk="1" latinLnBrk="0" hangingPunct="1">
+              <a:defRPr sz="1350" kern="1200">
+                <a:solidFill>
+                  <a:schemeClr val="lt1"/>
+                </a:solidFill>
+                <a:latin typeface="+mn-lt"/>
+                <a:ea typeface="+mn-ea"/>
+                <a:cs typeface="+mn-cs"/>
+              </a:defRPr>
+            </a:lvl9pPr>
+          </a:lstStyle>
+          <a:p>
+            <a:pPr algn="ctr"/>
+            <a:r>
+              <a:rPr lang="es-ES" altLang="zh-CN" sz="2000" dirty="0" smtClean="0">
+                <a:solidFill>
+                  <a:schemeClr val="bg1"/>
+                </a:solidFill>
+              </a:rPr>
+              <a:t>una encomienda esta formada por uno o muchos y estos productos pueden estar en muchas encomiendas</a:t>
+            </a:r>
+            <a:endParaRPr lang="zh-CN" altLang="en-US" sz="2000" dirty="0">
+              <a:solidFill>
+                <a:schemeClr val="bg1"/>
+              </a:solidFill>
+            </a:endParaRPr>
+          </a:p>
+        </p:txBody>
+      </p:sp>
+      <p:sp>
+        <p:nvSpPr>
+          <p:cNvPr id="6" name="箭头: V 形 105"/>
+          <p:cNvSpPr/>
+          <p:nvPr/>
+        </p:nvSpPr>
+        <p:spPr>
+          <a:xfrm flipH="1">
+            <a:off x="6457950" y="1819028"/>
+            <a:ext cx="5734048" cy="1794507"/>
+          </a:xfrm>
+          <a:prstGeom prst="chevron">
+            <a:avLst>
+              <a:gd name="adj" fmla="val 29021"/>
+            </a:avLst>
+          </a:prstGeom>
+          <a:gradFill flip="none" rotWithShape="1">
+            <a:gsLst>
+              <a:gs pos="0">
+                <a:srgbClr val="F9AC7D"/>
+              </a:gs>
+              <a:gs pos="100000">
+                <a:srgbClr val="F28893"/>
+              </a:gs>
+            </a:gsLst>
+            <a:lin ang="0" scaled="1"/>
+            <a:tileRect/>
+          </a:gradFill>
+          <a:ln>
+            <a:noFill/>
+          </a:ln>
+        </p:spPr>
+        <p:style>
+          <a:lnRef idx="2">
+            <a:schemeClr val="accent1">
+              <a:shade val="50000"/>
+            </a:schemeClr>
+          </a:lnRef>
+          <a:fillRef idx="1">
+            <a:schemeClr val="accent1"/>
+          </a:fillRef>
+          <a:effectRef idx="0">
+            <a:schemeClr val="accent1"/>
+          </a:effectRef>
+          <a:fontRef idx="minor">
+            <a:schemeClr val="lt1"/>
+          </a:fontRef>
+        </p:style>
+        <p:txBody>
+          <a:bodyPr rtlCol="0" anchor="ctr"/>
+          <a:lstStyle>
+            <a:defPPr>
+              <a:defRPr lang="en-US">
+                <a:solidFill>
+                  <a:schemeClr val="lt1"/>
+                </a:solidFill>
+              </a:defRPr>
+            </a:defPPr>
+            <a:lvl1pPr marL="0" algn="l" defTabSz="685800" rtl="0" eaLnBrk="1" latinLnBrk="0" hangingPunct="1">
+              <a:defRPr sz="1350" kern="1200">
+                <a:solidFill>
+                  <a:schemeClr val="lt1"/>
+                </a:solidFill>
+                <a:latin typeface="+mn-lt"/>
+                <a:ea typeface="+mn-ea"/>
+                <a:cs typeface="+mn-cs"/>
+              </a:defRPr>
+            </a:lvl1pPr>
+            <a:lvl2pPr marL="342900" algn="l" defTabSz="685800" rtl="0" eaLnBrk="1" latinLnBrk="0" hangingPunct="1">
+              <a:defRPr sz="1350" kern="1200">
+                <a:solidFill>
+                  <a:schemeClr val="lt1"/>
+                </a:solidFill>
+                <a:latin typeface="+mn-lt"/>
+                <a:ea typeface="+mn-ea"/>
+                <a:cs typeface="+mn-cs"/>
+              </a:defRPr>
+            </a:lvl2pPr>
+            <a:lvl3pPr marL="685800" algn="l" defTabSz="685800" rtl="0" eaLnBrk="1" latinLnBrk="0" hangingPunct="1">
+              <a:defRPr sz="1350" kern="1200">
+                <a:solidFill>
+                  <a:schemeClr val="lt1"/>
+                </a:solidFill>
+                <a:latin typeface="+mn-lt"/>
+                <a:ea typeface="+mn-ea"/>
+                <a:cs typeface="+mn-cs"/>
+              </a:defRPr>
+            </a:lvl3pPr>
+            <a:lvl4pPr marL="1028700" algn="l" defTabSz="685800" rtl="0" eaLnBrk="1" latinLnBrk="0" hangingPunct="1">
+              <a:defRPr sz="1350" kern="1200">
+                <a:solidFill>
+                  <a:schemeClr val="lt1"/>
+                </a:solidFill>
+                <a:latin typeface="+mn-lt"/>
+                <a:ea typeface="+mn-ea"/>
+                <a:cs typeface="+mn-cs"/>
+              </a:defRPr>
+            </a:lvl4pPr>
+            <a:lvl5pPr marL="1371600" algn="l" defTabSz="685800" rtl="0" eaLnBrk="1" latinLnBrk="0" hangingPunct="1">
+              <a:defRPr sz="1350" kern="1200">
+                <a:solidFill>
+                  <a:schemeClr val="lt1"/>
+                </a:solidFill>
+                <a:latin typeface="+mn-lt"/>
+                <a:ea typeface="+mn-ea"/>
+                <a:cs typeface="+mn-cs"/>
+              </a:defRPr>
+            </a:lvl5pPr>
+            <a:lvl6pPr marL="1714500" algn="l" defTabSz="685800" rtl="0" eaLnBrk="1" latinLnBrk="0" hangingPunct="1">
+              <a:defRPr sz="1350" kern="1200">
+                <a:solidFill>
+                  <a:schemeClr val="lt1"/>
+                </a:solidFill>
+                <a:latin typeface="+mn-lt"/>
+                <a:ea typeface="+mn-ea"/>
+                <a:cs typeface="+mn-cs"/>
+              </a:defRPr>
+            </a:lvl6pPr>
+            <a:lvl7pPr marL="2057400" algn="l" defTabSz="685800" rtl="0" eaLnBrk="1" latinLnBrk="0" hangingPunct="1">
+              <a:defRPr sz="1350" kern="1200">
+                <a:solidFill>
+                  <a:schemeClr val="lt1"/>
+                </a:solidFill>
+                <a:latin typeface="+mn-lt"/>
+                <a:ea typeface="+mn-ea"/>
+                <a:cs typeface="+mn-cs"/>
+              </a:defRPr>
+            </a:lvl7pPr>
+            <a:lvl8pPr marL="2400300" algn="l" defTabSz="685800" rtl="0" eaLnBrk="1" latinLnBrk="0" hangingPunct="1">
+              <a:defRPr sz="1350" kern="1200">
+                <a:solidFill>
+                  <a:schemeClr val="lt1"/>
+                </a:solidFill>
+                <a:latin typeface="+mn-lt"/>
+                <a:ea typeface="+mn-ea"/>
+                <a:cs typeface="+mn-cs"/>
+              </a:defRPr>
+            </a:lvl8pPr>
+            <a:lvl9pPr marL="2743200" algn="l" defTabSz="685800" rtl="0" eaLnBrk="1" latinLnBrk="0" hangingPunct="1">
+              <a:defRPr sz="1350" kern="1200">
+                <a:solidFill>
+                  <a:schemeClr val="lt1"/>
+                </a:solidFill>
+                <a:latin typeface="+mn-lt"/>
+                <a:ea typeface="+mn-ea"/>
+                <a:cs typeface="+mn-cs"/>
+              </a:defRPr>
+            </a:lvl9pPr>
+          </a:lstStyle>
+          <a:p>
+            <a:pPr algn="ctr"/>
+            <a:r>
+              <a:rPr lang="es-ES" altLang="zh-CN" sz="2000" dirty="0" smtClean="0">
+                <a:solidFill>
+                  <a:schemeClr val="bg1"/>
+                </a:solidFill>
+              </a:rPr>
+              <a:t>Los productos pueden deben de ser de una categoría en especifico, alimentos, medicina, documentación, el administrador podrá registrar si un producto es permitido o no </a:t>
+            </a:r>
+            <a:endParaRPr lang="zh-CN" altLang="en-US" sz="2000" dirty="0">
+              <a:solidFill>
+                <a:schemeClr val="bg1"/>
+              </a:solidFill>
+            </a:endParaRPr>
+          </a:p>
+        </p:txBody>
+      </p:sp>
+      <p:sp>
+        <p:nvSpPr>
+          <p:cNvPr id="7" name="箭头: V 形 105"/>
+          <p:cNvSpPr/>
+          <p:nvPr/>
+        </p:nvSpPr>
+        <p:spPr>
+          <a:xfrm flipH="1">
+            <a:off x="6589180" y="3698020"/>
+            <a:ext cx="5602819" cy="862960"/>
+          </a:xfrm>
+          <a:prstGeom prst="chevron">
+            <a:avLst>
+              <a:gd name="adj" fmla="val 29021"/>
+            </a:avLst>
+          </a:prstGeom>
+          <a:gradFill flip="none" rotWithShape="1">
+            <a:gsLst>
+              <a:gs pos="0">
+                <a:srgbClr val="F9AC7D"/>
+              </a:gs>
+              <a:gs pos="100000">
+                <a:srgbClr val="F28893"/>
+              </a:gs>
+            </a:gsLst>
+            <a:lin ang="0" scaled="1"/>
+            <a:tileRect/>
+          </a:gradFill>
+          <a:ln>
+            <a:noFill/>
+          </a:ln>
+        </p:spPr>
+        <p:style>
+          <a:lnRef idx="2">
+            <a:schemeClr val="accent1">
+              <a:shade val="50000"/>
+            </a:schemeClr>
+          </a:lnRef>
+          <a:fillRef idx="1">
+            <a:schemeClr val="accent1"/>
+          </a:fillRef>
+          <a:effectRef idx="0">
+            <a:schemeClr val="accent1"/>
+          </a:effectRef>
+          <a:fontRef idx="minor">
+            <a:schemeClr val="lt1"/>
+          </a:fontRef>
+        </p:style>
+        <p:txBody>
+          <a:bodyPr rtlCol="0" anchor="ctr"/>
+          <a:lstStyle>
+            <a:defPPr>
+              <a:defRPr lang="en-US">
+                <a:solidFill>
+                  <a:schemeClr val="lt1"/>
+                </a:solidFill>
+              </a:defRPr>
+            </a:defPPr>
+            <a:lvl1pPr marL="0" algn="l" defTabSz="685800" rtl="0" eaLnBrk="1" latinLnBrk="0" hangingPunct="1">
+              <a:defRPr sz="1350" kern="1200">
+                <a:solidFill>
+                  <a:schemeClr val="lt1"/>
+                </a:solidFill>
+                <a:latin typeface="+mn-lt"/>
+                <a:ea typeface="+mn-ea"/>
+                <a:cs typeface="+mn-cs"/>
+              </a:defRPr>
+            </a:lvl1pPr>
+            <a:lvl2pPr marL="342900" algn="l" defTabSz="685800" rtl="0" eaLnBrk="1" latinLnBrk="0" hangingPunct="1">
+              <a:defRPr sz="1350" kern="1200">
+                <a:solidFill>
+                  <a:schemeClr val="lt1"/>
+                </a:solidFill>
+                <a:latin typeface="+mn-lt"/>
+                <a:ea typeface="+mn-ea"/>
+                <a:cs typeface="+mn-cs"/>
+              </a:defRPr>
+            </a:lvl2pPr>
+            <a:lvl3pPr marL="685800" algn="l" defTabSz="685800" rtl="0" eaLnBrk="1" latinLnBrk="0" hangingPunct="1">
+              <a:defRPr sz="1350" kern="1200">
+                <a:solidFill>
+                  <a:schemeClr val="lt1"/>
+                </a:solidFill>
+                <a:latin typeface="+mn-lt"/>
+                <a:ea typeface="+mn-ea"/>
+                <a:cs typeface="+mn-cs"/>
+              </a:defRPr>
+            </a:lvl3pPr>
+            <a:lvl4pPr marL="1028700" algn="l" defTabSz="685800" rtl="0" eaLnBrk="1" latinLnBrk="0" hangingPunct="1">
+              <a:defRPr sz="1350" kern="1200">
+                <a:solidFill>
+                  <a:schemeClr val="lt1"/>
+                </a:solidFill>
+                <a:latin typeface="+mn-lt"/>
+                <a:ea typeface="+mn-ea"/>
+                <a:cs typeface="+mn-cs"/>
+              </a:defRPr>
+            </a:lvl4pPr>
+            <a:lvl5pPr marL="1371600" algn="l" defTabSz="685800" rtl="0" eaLnBrk="1" latinLnBrk="0" hangingPunct="1">
+              <a:defRPr sz="1350" kern="1200">
+                <a:solidFill>
+                  <a:schemeClr val="lt1"/>
+                </a:solidFill>
+                <a:latin typeface="+mn-lt"/>
+                <a:ea typeface="+mn-ea"/>
+                <a:cs typeface="+mn-cs"/>
+              </a:defRPr>
+            </a:lvl5pPr>
+            <a:lvl6pPr marL="1714500" algn="l" defTabSz="685800" rtl="0" eaLnBrk="1" latinLnBrk="0" hangingPunct="1">
+              <a:defRPr sz="1350" kern="1200">
+                <a:solidFill>
+                  <a:schemeClr val="lt1"/>
+                </a:solidFill>
+                <a:latin typeface="+mn-lt"/>
+                <a:ea typeface="+mn-ea"/>
+                <a:cs typeface="+mn-cs"/>
+              </a:defRPr>
+            </a:lvl6pPr>
+            <a:lvl7pPr marL="2057400" algn="l" defTabSz="685800" rtl="0" eaLnBrk="1" latinLnBrk="0" hangingPunct="1">
+              <a:defRPr sz="1350" kern="1200">
+                <a:solidFill>
+                  <a:schemeClr val="lt1"/>
+                </a:solidFill>
+                <a:latin typeface="+mn-lt"/>
+                <a:ea typeface="+mn-ea"/>
+                <a:cs typeface="+mn-cs"/>
+              </a:defRPr>
+            </a:lvl7pPr>
+            <a:lvl8pPr marL="2400300" algn="l" defTabSz="685800" rtl="0" eaLnBrk="1" latinLnBrk="0" hangingPunct="1">
+              <a:defRPr sz="1350" kern="1200">
+                <a:solidFill>
+                  <a:schemeClr val="lt1"/>
+                </a:solidFill>
+                <a:latin typeface="+mn-lt"/>
+                <a:ea typeface="+mn-ea"/>
+                <a:cs typeface="+mn-cs"/>
+              </a:defRPr>
+            </a:lvl8pPr>
+            <a:lvl9pPr marL="2743200" algn="l" defTabSz="685800" rtl="0" eaLnBrk="1" latinLnBrk="0" hangingPunct="1">
+              <a:defRPr sz="1350" kern="1200">
+                <a:solidFill>
+                  <a:schemeClr val="lt1"/>
+                </a:solidFill>
+                <a:latin typeface="+mn-lt"/>
+                <a:ea typeface="+mn-ea"/>
+                <a:cs typeface="+mn-cs"/>
+              </a:defRPr>
+            </a:lvl9pPr>
+          </a:lstStyle>
+          <a:p>
+            <a:pPr algn="ctr"/>
+            <a:r>
+              <a:rPr lang="es-ES" altLang="zh-CN" sz="2000" dirty="0" smtClean="0">
+                <a:solidFill>
+                  <a:schemeClr val="bg1"/>
+                </a:solidFill>
+              </a:rPr>
+              <a:t>Los productos pueden tener distintas reglas, tarifa por cantidad, unidad de medición etc.</a:t>
+            </a:r>
+            <a:endParaRPr lang="zh-CN" altLang="en-US" sz="2000" dirty="0">
+              <a:solidFill>
+                <a:schemeClr val="bg1"/>
+              </a:solidFill>
+            </a:endParaRPr>
+          </a:p>
+        </p:txBody>
+      </p:sp>
+      <p:sp>
+        <p:nvSpPr>
+          <p:cNvPr id="8" name="箭头: V 形 105"/>
+          <p:cNvSpPr/>
+          <p:nvPr/>
+        </p:nvSpPr>
+        <p:spPr>
+          <a:xfrm flipH="1">
+            <a:off x="6495589" y="4690780"/>
+            <a:ext cx="5696407" cy="1335448"/>
+          </a:xfrm>
+          <a:prstGeom prst="chevron">
+            <a:avLst>
+              <a:gd name="adj" fmla="val 29021"/>
+            </a:avLst>
+          </a:prstGeom>
+          <a:gradFill flip="none" rotWithShape="1">
+            <a:gsLst>
+              <a:gs pos="0">
+                <a:srgbClr val="F9AC7D"/>
+              </a:gs>
+              <a:gs pos="100000">
+                <a:srgbClr val="F28893"/>
+              </a:gs>
+            </a:gsLst>
+            <a:lin ang="0" scaled="1"/>
+            <a:tileRect/>
+          </a:gradFill>
+          <a:ln>
+            <a:noFill/>
+          </a:ln>
+        </p:spPr>
+        <p:style>
+          <a:lnRef idx="2">
+            <a:schemeClr val="accent1">
+              <a:shade val="50000"/>
+            </a:schemeClr>
+          </a:lnRef>
+          <a:fillRef idx="1">
+            <a:schemeClr val="accent1"/>
+          </a:fillRef>
+          <a:effectRef idx="0">
+            <a:schemeClr val="accent1"/>
+          </a:effectRef>
+          <a:fontRef idx="minor">
+            <a:schemeClr val="lt1"/>
+          </a:fontRef>
+        </p:style>
+        <p:txBody>
+          <a:bodyPr rtlCol="0" anchor="ctr"/>
+          <a:lstStyle>
+            <a:defPPr>
+              <a:defRPr lang="en-US">
+                <a:solidFill>
+                  <a:schemeClr val="lt1"/>
+                </a:solidFill>
+              </a:defRPr>
+            </a:defPPr>
+            <a:lvl1pPr marL="0" algn="l" defTabSz="685800" rtl="0" eaLnBrk="1" latinLnBrk="0" hangingPunct="1">
+              <a:defRPr sz="1350" kern="1200">
+                <a:solidFill>
+                  <a:schemeClr val="lt1"/>
+                </a:solidFill>
+                <a:latin typeface="+mn-lt"/>
+                <a:ea typeface="+mn-ea"/>
+                <a:cs typeface="+mn-cs"/>
+              </a:defRPr>
+            </a:lvl1pPr>
+            <a:lvl2pPr marL="342900" algn="l" defTabSz="685800" rtl="0" eaLnBrk="1" latinLnBrk="0" hangingPunct="1">
+              <a:defRPr sz="1350" kern="1200">
+                <a:solidFill>
+                  <a:schemeClr val="lt1"/>
+                </a:solidFill>
+                <a:latin typeface="+mn-lt"/>
+                <a:ea typeface="+mn-ea"/>
+                <a:cs typeface="+mn-cs"/>
+              </a:defRPr>
+            </a:lvl2pPr>
+            <a:lvl3pPr marL="685800" algn="l" defTabSz="685800" rtl="0" eaLnBrk="1" latinLnBrk="0" hangingPunct="1">
+              <a:defRPr sz="1350" kern="1200">
+                <a:solidFill>
+                  <a:schemeClr val="lt1"/>
+                </a:solidFill>
+                <a:latin typeface="+mn-lt"/>
+                <a:ea typeface="+mn-ea"/>
+                <a:cs typeface="+mn-cs"/>
+              </a:defRPr>
+            </a:lvl3pPr>
+            <a:lvl4pPr marL="1028700" algn="l" defTabSz="685800" rtl="0" eaLnBrk="1" latinLnBrk="0" hangingPunct="1">
+              <a:defRPr sz="1350" kern="1200">
+                <a:solidFill>
+                  <a:schemeClr val="lt1"/>
+                </a:solidFill>
+                <a:latin typeface="+mn-lt"/>
+                <a:ea typeface="+mn-ea"/>
+                <a:cs typeface="+mn-cs"/>
+              </a:defRPr>
+            </a:lvl4pPr>
+            <a:lvl5pPr marL="1371600" algn="l" defTabSz="685800" rtl="0" eaLnBrk="1" latinLnBrk="0" hangingPunct="1">
+              <a:defRPr sz="1350" kern="1200">
+                <a:solidFill>
+                  <a:schemeClr val="lt1"/>
+                </a:solidFill>
+                <a:latin typeface="+mn-lt"/>
+                <a:ea typeface="+mn-ea"/>
+                <a:cs typeface="+mn-cs"/>
+              </a:defRPr>
+            </a:lvl5pPr>
+            <a:lvl6pPr marL="1714500" algn="l" defTabSz="685800" rtl="0" eaLnBrk="1" latinLnBrk="0" hangingPunct="1">
+              <a:defRPr sz="1350" kern="1200">
+                <a:solidFill>
+                  <a:schemeClr val="lt1"/>
+                </a:solidFill>
+                <a:latin typeface="+mn-lt"/>
+                <a:ea typeface="+mn-ea"/>
+                <a:cs typeface="+mn-cs"/>
+              </a:defRPr>
+            </a:lvl6pPr>
+            <a:lvl7pPr marL="2057400" algn="l" defTabSz="685800" rtl="0" eaLnBrk="1" latinLnBrk="0" hangingPunct="1">
+              <a:defRPr sz="1350" kern="1200">
+                <a:solidFill>
+                  <a:schemeClr val="lt1"/>
+                </a:solidFill>
+                <a:latin typeface="+mn-lt"/>
+                <a:ea typeface="+mn-ea"/>
+                <a:cs typeface="+mn-cs"/>
+              </a:defRPr>
+            </a:lvl7pPr>
+            <a:lvl8pPr marL="2400300" algn="l" defTabSz="685800" rtl="0" eaLnBrk="1" latinLnBrk="0" hangingPunct="1">
+              <a:defRPr sz="1350" kern="1200">
+                <a:solidFill>
+                  <a:schemeClr val="lt1"/>
+                </a:solidFill>
+                <a:latin typeface="+mn-lt"/>
+                <a:ea typeface="+mn-ea"/>
+                <a:cs typeface="+mn-cs"/>
+              </a:defRPr>
+            </a:lvl8pPr>
+            <a:lvl9pPr marL="2743200" algn="l" defTabSz="685800" rtl="0" eaLnBrk="1" latinLnBrk="0" hangingPunct="1">
+              <a:defRPr sz="1350" kern="1200">
+                <a:solidFill>
+                  <a:schemeClr val="lt1"/>
+                </a:solidFill>
+                <a:latin typeface="+mn-lt"/>
+                <a:ea typeface="+mn-ea"/>
+                <a:cs typeface="+mn-cs"/>
+              </a:defRPr>
+            </a:lvl9pPr>
+          </a:lstStyle>
+          <a:p>
+            <a:pPr algn="ctr"/>
+            <a:r>
+              <a:rPr lang="es-ES" altLang="zh-CN" sz="2000" dirty="0" smtClean="0">
+                <a:solidFill>
+                  <a:schemeClr val="bg1"/>
+                </a:solidFill>
+              </a:rPr>
+              <a:t>La tabla </a:t>
+            </a:r>
+            <a:r>
+              <a:rPr lang="es-ES" altLang="zh-CN" sz="2000" dirty="0" err="1" smtClean="0">
+                <a:solidFill>
+                  <a:schemeClr val="bg1"/>
+                </a:solidFill>
+              </a:rPr>
+              <a:t>detalle_envio</a:t>
+            </a:r>
+            <a:r>
+              <a:rPr lang="es-ES" altLang="zh-CN" sz="2000" dirty="0" smtClean="0">
+                <a:solidFill>
+                  <a:schemeClr val="bg1"/>
+                </a:solidFill>
+              </a:rPr>
+              <a:t> detallara el avance en carretera que ha hecho una encomienda</a:t>
+            </a:r>
+            <a:endParaRPr lang="zh-CN" altLang="en-US" sz="2000" dirty="0">
+              <a:solidFill>
+                <a:schemeClr val="bg1"/>
+              </a:solidFill>
+            </a:endParaRPr>
+          </a:p>
+        </p:txBody>
+      </p:sp>
     </p:spTree>
     <p:extLst>
       <p:ext uri="{BB962C8B-B14F-4D97-AF65-F5344CB8AC3E}">
-        <p14:creationId xmlns:p14="http://schemas.microsoft.com/office/powerpoint/2010/main" val="2174911341"/>
+        <p14:creationId xmlns:p14="http://schemas.microsoft.com/office/powerpoint/2010/main" val="1970214700"/>
       </p:ext>
     </p:extLst>
   </p:cSld>
@@ -14684,8 +16860,8 @@
         </p:nvSpPr>
         <p:spPr>
           <a:xfrm flipH="1">
-            <a:off x="7250197" y="5279409"/>
-            <a:ext cx="4941803" cy="1028161"/>
+            <a:off x="6687238" y="79448"/>
+            <a:ext cx="5504760" cy="1028161"/>
           </a:xfrm>
           <a:prstGeom prst="chevron">
             <a:avLst>
@@ -14833,7 +17009,15 @@
                   <a:schemeClr val="bg1"/>
                 </a:solidFill>
               </a:rPr>
-              <a:t>El usuario…</a:t>
+              <a:t>El </a:t>
+            </a:r>
+            <a:r>
+              <a:rPr lang="es-ES" altLang="zh-CN" sz="2000" dirty="0" smtClean="0">
+                <a:solidFill>
+                  <a:schemeClr val="bg1"/>
+                </a:solidFill>
+              </a:rPr>
+              <a:t>usuario puede solicitar una asesoría migratoria, para la realización de una asesoría </a:t>
             </a:r>
             <a:endParaRPr lang="zh-CN" altLang="en-US" sz="2000" dirty="0">
               <a:solidFill>
@@ -14845,7 +17029,7 @@
       </p:sp>
       <p:pic>
         <p:nvPicPr>
-          <p:cNvPr id="5122" name="Picture 2"/>
+          <p:cNvPr id="4098" name="Picture 2"/>
           <p:cNvPicPr>
             <a:picLocks noChangeAspect="1" noChangeArrowheads="1"/>
           </p:cNvPicPr>
@@ -14866,8 +17050,8 @@
         </p:blipFill>
         <p:spPr bwMode="auto">
           <a:xfrm>
-            <a:off x="457199" y="267780"/>
-            <a:ext cx="6305551" cy="6371693"/>
+            <a:off x="471488" y="290059"/>
+            <a:ext cx="6058459" cy="6569961"/>
           </a:xfrm>
           <a:prstGeom prst="roundRect">
             <a:avLst>
@@ -14890,21 +17074,689 @@
           <a:effectLst>
             <a:reflection blurRad="12700" stA="38000" endPos="28000" dist="5000" dir="5400000" sy="-100000" algn="bl" rotWithShape="0"/>
           </a:effectLst>
-          <a:extLst>
-            <a:ext uri="{909E8E84-426E-40DD-AFC4-6F175D3DCCD1}">
-              <a14:hiddenFill xmlns:a14="http://schemas.microsoft.com/office/drawing/2010/main">
-                <a:solidFill>
-                  <a:schemeClr val="accent1"/>
-                </a:solidFill>
-              </a14:hiddenFill>
-            </a:ext>
-          </a:extLst>
+          <a:extLst/>
         </p:spPr>
       </p:pic>
+      <p:sp>
+        <p:nvSpPr>
+          <p:cNvPr id="5" name="箭头: V 形 105"/>
+          <p:cNvSpPr/>
+          <p:nvPr/>
+        </p:nvSpPr>
+        <p:spPr>
+          <a:xfrm flipH="1">
+            <a:off x="6687240" y="1211719"/>
+            <a:ext cx="5504760" cy="1028161"/>
+          </a:xfrm>
+          <a:prstGeom prst="chevron">
+            <a:avLst>
+              <a:gd name="adj" fmla="val 29021"/>
+            </a:avLst>
+          </a:prstGeom>
+          <a:gradFill flip="none" rotWithShape="1">
+            <a:gsLst>
+              <a:gs pos="0">
+                <a:srgbClr val="F9AC7D"/>
+              </a:gs>
+              <a:gs pos="100000">
+                <a:srgbClr val="F28893"/>
+              </a:gs>
+            </a:gsLst>
+            <a:lin ang="0" scaled="1"/>
+            <a:tileRect/>
+          </a:gradFill>
+          <a:ln>
+            <a:noFill/>
+          </a:ln>
+        </p:spPr>
+        <p:style>
+          <a:lnRef idx="2">
+            <a:schemeClr val="accent1">
+              <a:shade val="50000"/>
+            </a:schemeClr>
+          </a:lnRef>
+          <a:fillRef idx="1">
+            <a:schemeClr val="accent1"/>
+          </a:fillRef>
+          <a:effectRef idx="0">
+            <a:schemeClr val="accent1"/>
+          </a:effectRef>
+          <a:fontRef idx="minor">
+            <a:schemeClr val="lt1"/>
+          </a:fontRef>
+        </p:style>
+        <p:txBody>
+          <a:bodyPr rtlCol="0" anchor="ctr"/>
+          <a:lstStyle>
+            <a:defPPr>
+              <a:defRPr lang="en-US">
+                <a:solidFill>
+                  <a:schemeClr val="lt1"/>
+                </a:solidFill>
+              </a:defRPr>
+            </a:defPPr>
+            <a:lvl1pPr marL="0" algn="l" defTabSz="685800" rtl="0" eaLnBrk="1" latinLnBrk="0" hangingPunct="1">
+              <a:defRPr sz="1350" kern="1200">
+                <a:solidFill>
+                  <a:schemeClr val="lt1"/>
+                </a:solidFill>
+                <a:latin typeface="+mn-lt"/>
+                <a:ea typeface="+mn-ea"/>
+                <a:cs typeface="+mn-cs"/>
+              </a:defRPr>
+            </a:lvl1pPr>
+            <a:lvl2pPr marL="342900" algn="l" defTabSz="685800" rtl="0" eaLnBrk="1" latinLnBrk="0" hangingPunct="1">
+              <a:defRPr sz="1350" kern="1200">
+                <a:solidFill>
+                  <a:schemeClr val="lt1"/>
+                </a:solidFill>
+                <a:latin typeface="+mn-lt"/>
+                <a:ea typeface="+mn-ea"/>
+                <a:cs typeface="+mn-cs"/>
+              </a:defRPr>
+            </a:lvl2pPr>
+            <a:lvl3pPr marL="685800" algn="l" defTabSz="685800" rtl="0" eaLnBrk="1" latinLnBrk="0" hangingPunct="1">
+              <a:defRPr sz="1350" kern="1200">
+                <a:solidFill>
+                  <a:schemeClr val="lt1"/>
+                </a:solidFill>
+                <a:latin typeface="+mn-lt"/>
+                <a:ea typeface="+mn-ea"/>
+                <a:cs typeface="+mn-cs"/>
+              </a:defRPr>
+            </a:lvl3pPr>
+            <a:lvl4pPr marL="1028700" algn="l" defTabSz="685800" rtl="0" eaLnBrk="1" latinLnBrk="0" hangingPunct="1">
+              <a:defRPr sz="1350" kern="1200">
+                <a:solidFill>
+                  <a:schemeClr val="lt1"/>
+                </a:solidFill>
+                <a:latin typeface="+mn-lt"/>
+                <a:ea typeface="+mn-ea"/>
+                <a:cs typeface="+mn-cs"/>
+              </a:defRPr>
+            </a:lvl4pPr>
+            <a:lvl5pPr marL="1371600" algn="l" defTabSz="685800" rtl="0" eaLnBrk="1" latinLnBrk="0" hangingPunct="1">
+              <a:defRPr sz="1350" kern="1200">
+                <a:solidFill>
+                  <a:schemeClr val="lt1"/>
+                </a:solidFill>
+                <a:latin typeface="+mn-lt"/>
+                <a:ea typeface="+mn-ea"/>
+                <a:cs typeface="+mn-cs"/>
+              </a:defRPr>
+            </a:lvl5pPr>
+            <a:lvl6pPr marL="1714500" algn="l" defTabSz="685800" rtl="0" eaLnBrk="1" latinLnBrk="0" hangingPunct="1">
+              <a:defRPr sz="1350" kern="1200">
+                <a:solidFill>
+                  <a:schemeClr val="lt1"/>
+                </a:solidFill>
+                <a:latin typeface="+mn-lt"/>
+                <a:ea typeface="+mn-ea"/>
+                <a:cs typeface="+mn-cs"/>
+              </a:defRPr>
+            </a:lvl6pPr>
+            <a:lvl7pPr marL="2057400" algn="l" defTabSz="685800" rtl="0" eaLnBrk="1" latinLnBrk="0" hangingPunct="1">
+              <a:defRPr sz="1350" kern="1200">
+                <a:solidFill>
+                  <a:schemeClr val="lt1"/>
+                </a:solidFill>
+                <a:latin typeface="+mn-lt"/>
+                <a:ea typeface="+mn-ea"/>
+                <a:cs typeface="+mn-cs"/>
+              </a:defRPr>
+            </a:lvl7pPr>
+            <a:lvl8pPr marL="2400300" algn="l" defTabSz="685800" rtl="0" eaLnBrk="1" latinLnBrk="0" hangingPunct="1">
+              <a:defRPr sz="1350" kern="1200">
+                <a:solidFill>
+                  <a:schemeClr val="lt1"/>
+                </a:solidFill>
+                <a:latin typeface="+mn-lt"/>
+                <a:ea typeface="+mn-ea"/>
+                <a:cs typeface="+mn-cs"/>
+              </a:defRPr>
+            </a:lvl8pPr>
+            <a:lvl9pPr marL="2743200" algn="l" defTabSz="685800" rtl="0" eaLnBrk="1" latinLnBrk="0" hangingPunct="1">
+              <a:defRPr sz="1350" kern="1200">
+                <a:solidFill>
+                  <a:schemeClr val="lt1"/>
+                </a:solidFill>
+                <a:latin typeface="+mn-lt"/>
+                <a:ea typeface="+mn-ea"/>
+                <a:cs typeface="+mn-cs"/>
+              </a:defRPr>
+            </a:lvl9pPr>
+          </a:lstStyle>
+          <a:p>
+            <a:pPr algn="ctr"/>
+            <a:r>
+              <a:rPr lang="es-ES" altLang="zh-CN" sz="2000" dirty="0" smtClean="0">
+                <a:solidFill>
+                  <a:schemeClr val="bg1"/>
+                </a:solidFill>
+              </a:rPr>
+              <a:t>En la asesoría se llenaran todos los datos migratorios de los clientes y así llevar un registro para una futura </a:t>
+            </a:r>
+            <a:r>
+              <a:rPr lang="es-ES" altLang="zh-CN" sz="2000" dirty="0" err="1" smtClean="0">
+                <a:solidFill>
+                  <a:schemeClr val="bg1"/>
+                </a:solidFill>
+              </a:rPr>
+              <a:t>asesoria</a:t>
+            </a:r>
+            <a:endParaRPr lang="zh-CN" altLang="en-US" sz="2000" dirty="0">
+              <a:solidFill>
+                <a:schemeClr val="bg1"/>
+              </a:solidFill>
+            </a:endParaRPr>
+          </a:p>
+        </p:txBody>
+      </p:sp>
+      <p:sp>
+        <p:nvSpPr>
+          <p:cNvPr id="6" name="箭头: V 形 105"/>
+          <p:cNvSpPr/>
+          <p:nvPr/>
+        </p:nvSpPr>
+        <p:spPr>
+          <a:xfrm flipH="1">
+            <a:off x="6608593" y="2388607"/>
+            <a:ext cx="5504760" cy="1313730"/>
+          </a:xfrm>
+          <a:prstGeom prst="chevron">
+            <a:avLst>
+              <a:gd name="adj" fmla="val 29021"/>
+            </a:avLst>
+          </a:prstGeom>
+          <a:gradFill flip="none" rotWithShape="1">
+            <a:gsLst>
+              <a:gs pos="0">
+                <a:srgbClr val="F9AC7D"/>
+              </a:gs>
+              <a:gs pos="100000">
+                <a:srgbClr val="F28893"/>
+              </a:gs>
+            </a:gsLst>
+            <a:lin ang="0" scaled="1"/>
+            <a:tileRect/>
+          </a:gradFill>
+          <a:ln>
+            <a:noFill/>
+          </a:ln>
+        </p:spPr>
+        <p:style>
+          <a:lnRef idx="2">
+            <a:schemeClr val="accent1">
+              <a:shade val="50000"/>
+            </a:schemeClr>
+          </a:lnRef>
+          <a:fillRef idx="1">
+            <a:schemeClr val="accent1"/>
+          </a:fillRef>
+          <a:effectRef idx="0">
+            <a:schemeClr val="accent1"/>
+          </a:effectRef>
+          <a:fontRef idx="minor">
+            <a:schemeClr val="lt1"/>
+          </a:fontRef>
+        </p:style>
+        <p:txBody>
+          <a:bodyPr rtlCol="0" anchor="ctr"/>
+          <a:lstStyle>
+            <a:defPPr>
+              <a:defRPr lang="en-US">
+                <a:solidFill>
+                  <a:schemeClr val="lt1"/>
+                </a:solidFill>
+              </a:defRPr>
+            </a:defPPr>
+            <a:lvl1pPr marL="0" algn="l" defTabSz="685800" rtl="0" eaLnBrk="1" latinLnBrk="0" hangingPunct="1">
+              <a:defRPr sz="1350" kern="1200">
+                <a:solidFill>
+                  <a:schemeClr val="lt1"/>
+                </a:solidFill>
+                <a:latin typeface="+mn-lt"/>
+                <a:ea typeface="+mn-ea"/>
+                <a:cs typeface="+mn-cs"/>
+              </a:defRPr>
+            </a:lvl1pPr>
+            <a:lvl2pPr marL="342900" algn="l" defTabSz="685800" rtl="0" eaLnBrk="1" latinLnBrk="0" hangingPunct="1">
+              <a:defRPr sz="1350" kern="1200">
+                <a:solidFill>
+                  <a:schemeClr val="lt1"/>
+                </a:solidFill>
+                <a:latin typeface="+mn-lt"/>
+                <a:ea typeface="+mn-ea"/>
+                <a:cs typeface="+mn-cs"/>
+              </a:defRPr>
+            </a:lvl2pPr>
+            <a:lvl3pPr marL="685800" algn="l" defTabSz="685800" rtl="0" eaLnBrk="1" latinLnBrk="0" hangingPunct="1">
+              <a:defRPr sz="1350" kern="1200">
+                <a:solidFill>
+                  <a:schemeClr val="lt1"/>
+                </a:solidFill>
+                <a:latin typeface="+mn-lt"/>
+                <a:ea typeface="+mn-ea"/>
+                <a:cs typeface="+mn-cs"/>
+              </a:defRPr>
+            </a:lvl3pPr>
+            <a:lvl4pPr marL="1028700" algn="l" defTabSz="685800" rtl="0" eaLnBrk="1" latinLnBrk="0" hangingPunct="1">
+              <a:defRPr sz="1350" kern="1200">
+                <a:solidFill>
+                  <a:schemeClr val="lt1"/>
+                </a:solidFill>
+                <a:latin typeface="+mn-lt"/>
+                <a:ea typeface="+mn-ea"/>
+                <a:cs typeface="+mn-cs"/>
+              </a:defRPr>
+            </a:lvl4pPr>
+            <a:lvl5pPr marL="1371600" algn="l" defTabSz="685800" rtl="0" eaLnBrk="1" latinLnBrk="0" hangingPunct="1">
+              <a:defRPr sz="1350" kern="1200">
+                <a:solidFill>
+                  <a:schemeClr val="lt1"/>
+                </a:solidFill>
+                <a:latin typeface="+mn-lt"/>
+                <a:ea typeface="+mn-ea"/>
+                <a:cs typeface="+mn-cs"/>
+              </a:defRPr>
+            </a:lvl5pPr>
+            <a:lvl6pPr marL="1714500" algn="l" defTabSz="685800" rtl="0" eaLnBrk="1" latinLnBrk="0" hangingPunct="1">
+              <a:defRPr sz="1350" kern="1200">
+                <a:solidFill>
+                  <a:schemeClr val="lt1"/>
+                </a:solidFill>
+                <a:latin typeface="+mn-lt"/>
+                <a:ea typeface="+mn-ea"/>
+                <a:cs typeface="+mn-cs"/>
+              </a:defRPr>
+            </a:lvl6pPr>
+            <a:lvl7pPr marL="2057400" algn="l" defTabSz="685800" rtl="0" eaLnBrk="1" latinLnBrk="0" hangingPunct="1">
+              <a:defRPr sz="1350" kern="1200">
+                <a:solidFill>
+                  <a:schemeClr val="lt1"/>
+                </a:solidFill>
+                <a:latin typeface="+mn-lt"/>
+                <a:ea typeface="+mn-ea"/>
+                <a:cs typeface="+mn-cs"/>
+              </a:defRPr>
+            </a:lvl7pPr>
+            <a:lvl8pPr marL="2400300" algn="l" defTabSz="685800" rtl="0" eaLnBrk="1" latinLnBrk="0" hangingPunct="1">
+              <a:defRPr sz="1350" kern="1200">
+                <a:solidFill>
+                  <a:schemeClr val="lt1"/>
+                </a:solidFill>
+                <a:latin typeface="+mn-lt"/>
+                <a:ea typeface="+mn-ea"/>
+                <a:cs typeface="+mn-cs"/>
+              </a:defRPr>
+            </a:lvl8pPr>
+            <a:lvl9pPr marL="2743200" algn="l" defTabSz="685800" rtl="0" eaLnBrk="1" latinLnBrk="0" hangingPunct="1">
+              <a:defRPr sz="1350" kern="1200">
+                <a:solidFill>
+                  <a:schemeClr val="lt1"/>
+                </a:solidFill>
+                <a:latin typeface="+mn-lt"/>
+                <a:ea typeface="+mn-ea"/>
+                <a:cs typeface="+mn-cs"/>
+              </a:defRPr>
+            </a:lvl9pPr>
+          </a:lstStyle>
+          <a:p>
+            <a:pPr algn="ctr"/>
+            <a:r>
+              <a:rPr lang="es-ES" altLang="zh-CN" sz="2000" dirty="0" smtClean="0">
+                <a:solidFill>
+                  <a:schemeClr val="bg1"/>
+                </a:solidFill>
+              </a:rPr>
+              <a:t>La asesoría se hace a través de un formulario migratorio (actualmente se realiza a mano y luego es llenado en la pagina de la embajada americana)</a:t>
+            </a:r>
+            <a:endParaRPr lang="zh-CN" altLang="en-US" sz="2000" dirty="0">
+              <a:solidFill>
+                <a:schemeClr val="bg1"/>
+              </a:solidFill>
+            </a:endParaRPr>
+          </a:p>
+        </p:txBody>
+      </p:sp>
+      <p:sp>
+        <p:nvSpPr>
+          <p:cNvPr id="7" name="箭头: V 形 105"/>
+          <p:cNvSpPr/>
+          <p:nvPr/>
+        </p:nvSpPr>
+        <p:spPr>
+          <a:xfrm flipH="1">
+            <a:off x="6687238" y="3851064"/>
+            <a:ext cx="5504760" cy="1075446"/>
+          </a:xfrm>
+          <a:prstGeom prst="chevron">
+            <a:avLst>
+              <a:gd name="adj" fmla="val 29021"/>
+            </a:avLst>
+          </a:prstGeom>
+          <a:gradFill flip="none" rotWithShape="1">
+            <a:gsLst>
+              <a:gs pos="0">
+                <a:srgbClr val="F9AC7D"/>
+              </a:gs>
+              <a:gs pos="100000">
+                <a:srgbClr val="F28893"/>
+              </a:gs>
+            </a:gsLst>
+            <a:lin ang="0" scaled="1"/>
+            <a:tileRect/>
+          </a:gradFill>
+          <a:ln>
+            <a:noFill/>
+          </a:ln>
+        </p:spPr>
+        <p:style>
+          <a:lnRef idx="2">
+            <a:schemeClr val="accent1">
+              <a:shade val="50000"/>
+            </a:schemeClr>
+          </a:lnRef>
+          <a:fillRef idx="1">
+            <a:schemeClr val="accent1"/>
+          </a:fillRef>
+          <a:effectRef idx="0">
+            <a:schemeClr val="accent1"/>
+          </a:effectRef>
+          <a:fontRef idx="minor">
+            <a:schemeClr val="lt1"/>
+          </a:fontRef>
+        </p:style>
+        <p:txBody>
+          <a:bodyPr rtlCol="0" anchor="ctr"/>
+          <a:lstStyle>
+            <a:defPPr>
+              <a:defRPr lang="en-US">
+                <a:solidFill>
+                  <a:schemeClr val="lt1"/>
+                </a:solidFill>
+              </a:defRPr>
+            </a:defPPr>
+            <a:lvl1pPr marL="0" algn="l" defTabSz="685800" rtl="0" eaLnBrk="1" latinLnBrk="0" hangingPunct="1">
+              <a:defRPr sz="1350" kern="1200">
+                <a:solidFill>
+                  <a:schemeClr val="lt1"/>
+                </a:solidFill>
+                <a:latin typeface="+mn-lt"/>
+                <a:ea typeface="+mn-ea"/>
+                <a:cs typeface="+mn-cs"/>
+              </a:defRPr>
+            </a:lvl1pPr>
+            <a:lvl2pPr marL="342900" algn="l" defTabSz="685800" rtl="0" eaLnBrk="1" latinLnBrk="0" hangingPunct="1">
+              <a:defRPr sz="1350" kern="1200">
+                <a:solidFill>
+                  <a:schemeClr val="lt1"/>
+                </a:solidFill>
+                <a:latin typeface="+mn-lt"/>
+                <a:ea typeface="+mn-ea"/>
+                <a:cs typeface="+mn-cs"/>
+              </a:defRPr>
+            </a:lvl2pPr>
+            <a:lvl3pPr marL="685800" algn="l" defTabSz="685800" rtl="0" eaLnBrk="1" latinLnBrk="0" hangingPunct="1">
+              <a:defRPr sz="1350" kern="1200">
+                <a:solidFill>
+                  <a:schemeClr val="lt1"/>
+                </a:solidFill>
+                <a:latin typeface="+mn-lt"/>
+                <a:ea typeface="+mn-ea"/>
+                <a:cs typeface="+mn-cs"/>
+              </a:defRPr>
+            </a:lvl3pPr>
+            <a:lvl4pPr marL="1028700" algn="l" defTabSz="685800" rtl="0" eaLnBrk="1" latinLnBrk="0" hangingPunct="1">
+              <a:defRPr sz="1350" kern="1200">
+                <a:solidFill>
+                  <a:schemeClr val="lt1"/>
+                </a:solidFill>
+                <a:latin typeface="+mn-lt"/>
+                <a:ea typeface="+mn-ea"/>
+                <a:cs typeface="+mn-cs"/>
+              </a:defRPr>
+            </a:lvl4pPr>
+            <a:lvl5pPr marL="1371600" algn="l" defTabSz="685800" rtl="0" eaLnBrk="1" latinLnBrk="0" hangingPunct="1">
+              <a:defRPr sz="1350" kern="1200">
+                <a:solidFill>
+                  <a:schemeClr val="lt1"/>
+                </a:solidFill>
+                <a:latin typeface="+mn-lt"/>
+                <a:ea typeface="+mn-ea"/>
+                <a:cs typeface="+mn-cs"/>
+              </a:defRPr>
+            </a:lvl5pPr>
+            <a:lvl6pPr marL="1714500" algn="l" defTabSz="685800" rtl="0" eaLnBrk="1" latinLnBrk="0" hangingPunct="1">
+              <a:defRPr sz="1350" kern="1200">
+                <a:solidFill>
+                  <a:schemeClr val="lt1"/>
+                </a:solidFill>
+                <a:latin typeface="+mn-lt"/>
+                <a:ea typeface="+mn-ea"/>
+                <a:cs typeface="+mn-cs"/>
+              </a:defRPr>
+            </a:lvl6pPr>
+            <a:lvl7pPr marL="2057400" algn="l" defTabSz="685800" rtl="0" eaLnBrk="1" latinLnBrk="0" hangingPunct="1">
+              <a:defRPr sz="1350" kern="1200">
+                <a:solidFill>
+                  <a:schemeClr val="lt1"/>
+                </a:solidFill>
+                <a:latin typeface="+mn-lt"/>
+                <a:ea typeface="+mn-ea"/>
+                <a:cs typeface="+mn-cs"/>
+              </a:defRPr>
+            </a:lvl7pPr>
+            <a:lvl8pPr marL="2400300" algn="l" defTabSz="685800" rtl="0" eaLnBrk="1" latinLnBrk="0" hangingPunct="1">
+              <a:defRPr sz="1350" kern="1200">
+                <a:solidFill>
+                  <a:schemeClr val="lt1"/>
+                </a:solidFill>
+                <a:latin typeface="+mn-lt"/>
+                <a:ea typeface="+mn-ea"/>
+                <a:cs typeface="+mn-cs"/>
+              </a:defRPr>
+            </a:lvl8pPr>
+            <a:lvl9pPr marL="2743200" algn="l" defTabSz="685800" rtl="0" eaLnBrk="1" latinLnBrk="0" hangingPunct="1">
+              <a:defRPr sz="1350" kern="1200">
+                <a:solidFill>
+                  <a:schemeClr val="lt1"/>
+                </a:solidFill>
+                <a:latin typeface="+mn-lt"/>
+                <a:ea typeface="+mn-ea"/>
+                <a:cs typeface="+mn-cs"/>
+              </a:defRPr>
+            </a:lvl9pPr>
+          </a:lstStyle>
+          <a:p>
+            <a:pPr algn="ctr"/>
+            <a:r>
+              <a:rPr lang="es-ES" altLang="zh-CN" sz="2000" dirty="0" smtClean="0">
+                <a:solidFill>
+                  <a:schemeClr val="bg1"/>
+                </a:solidFill>
+              </a:rPr>
+              <a:t>Los formularios a su vez están conformados por una o muchas preguntas</a:t>
+            </a:r>
+            <a:endParaRPr lang="zh-CN" altLang="en-US" sz="2000" dirty="0">
+              <a:solidFill>
+                <a:schemeClr val="bg1"/>
+              </a:solidFill>
+            </a:endParaRPr>
+          </a:p>
+        </p:txBody>
+      </p:sp>
+      <p:sp>
+        <p:nvSpPr>
+          <p:cNvPr id="8" name="箭头: V 形 105"/>
+          <p:cNvSpPr/>
+          <p:nvPr/>
+        </p:nvSpPr>
+        <p:spPr>
+          <a:xfrm flipH="1">
+            <a:off x="6687240" y="4983335"/>
+            <a:ext cx="5504760" cy="1075446"/>
+          </a:xfrm>
+          <a:prstGeom prst="chevron">
+            <a:avLst>
+              <a:gd name="adj" fmla="val 29021"/>
+            </a:avLst>
+          </a:prstGeom>
+          <a:gradFill flip="none" rotWithShape="1">
+            <a:gsLst>
+              <a:gs pos="0">
+                <a:srgbClr val="F9AC7D"/>
+              </a:gs>
+              <a:gs pos="100000">
+                <a:srgbClr val="F28893"/>
+              </a:gs>
+            </a:gsLst>
+            <a:lin ang="0" scaled="1"/>
+            <a:tileRect/>
+          </a:gradFill>
+          <a:ln>
+            <a:noFill/>
+          </a:ln>
+        </p:spPr>
+        <p:style>
+          <a:lnRef idx="2">
+            <a:schemeClr val="accent1">
+              <a:shade val="50000"/>
+            </a:schemeClr>
+          </a:lnRef>
+          <a:fillRef idx="1">
+            <a:schemeClr val="accent1"/>
+          </a:fillRef>
+          <a:effectRef idx="0">
+            <a:schemeClr val="accent1"/>
+          </a:effectRef>
+          <a:fontRef idx="minor">
+            <a:schemeClr val="lt1"/>
+          </a:fontRef>
+        </p:style>
+        <p:txBody>
+          <a:bodyPr rtlCol="0" anchor="ctr"/>
+          <a:lstStyle>
+            <a:defPPr>
+              <a:defRPr lang="en-US">
+                <a:solidFill>
+                  <a:schemeClr val="lt1"/>
+                </a:solidFill>
+              </a:defRPr>
+            </a:defPPr>
+            <a:lvl1pPr marL="0" algn="l" defTabSz="685800" rtl="0" eaLnBrk="1" latinLnBrk="0" hangingPunct="1">
+              <a:defRPr sz="1350" kern="1200">
+                <a:solidFill>
+                  <a:schemeClr val="lt1"/>
+                </a:solidFill>
+                <a:latin typeface="+mn-lt"/>
+                <a:ea typeface="+mn-ea"/>
+                <a:cs typeface="+mn-cs"/>
+              </a:defRPr>
+            </a:lvl1pPr>
+            <a:lvl2pPr marL="342900" algn="l" defTabSz="685800" rtl="0" eaLnBrk="1" latinLnBrk="0" hangingPunct="1">
+              <a:defRPr sz="1350" kern="1200">
+                <a:solidFill>
+                  <a:schemeClr val="lt1"/>
+                </a:solidFill>
+                <a:latin typeface="+mn-lt"/>
+                <a:ea typeface="+mn-ea"/>
+                <a:cs typeface="+mn-cs"/>
+              </a:defRPr>
+            </a:lvl2pPr>
+            <a:lvl3pPr marL="685800" algn="l" defTabSz="685800" rtl="0" eaLnBrk="1" latinLnBrk="0" hangingPunct="1">
+              <a:defRPr sz="1350" kern="1200">
+                <a:solidFill>
+                  <a:schemeClr val="lt1"/>
+                </a:solidFill>
+                <a:latin typeface="+mn-lt"/>
+                <a:ea typeface="+mn-ea"/>
+                <a:cs typeface="+mn-cs"/>
+              </a:defRPr>
+            </a:lvl3pPr>
+            <a:lvl4pPr marL="1028700" algn="l" defTabSz="685800" rtl="0" eaLnBrk="1" latinLnBrk="0" hangingPunct="1">
+              <a:defRPr sz="1350" kern="1200">
+                <a:solidFill>
+                  <a:schemeClr val="lt1"/>
+                </a:solidFill>
+                <a:latin typeface="+mn-lt"/>
+                <a:ea typeface="+mn-ea"/>
+                <a:cs typeface="+mn-cs"/>
+              </a:defRPr>
+            </a:lvl4pPr>
+            <a:lvl5pPr marL="1371600" algn="l" defTabSz="685800" rtl="0" eaLnBrk="1" latinLnBrk="0" hangingPunct="1">
+              <a:defRPr sz="1350" kern="1200">
+                <a:solidFill>
+                  <a:schemeClr val="lt1"/>
+                </a:solidFill>
+                <a:latin typeface="+mn-lt"/>
+                <a:ea typeface="+mn-ea"/>
+                <a:cs typeface="+mn-cs"/>
+              </a:defRPr>
+            </a:lvl5pPr>
+            <a:lvl6pPr marL="1714500" algn="l" defTabSz="685800" rtl="0" eaLnBrk="1" latinLnBrk="0" hangingPunct="1">
+              <a:defRPr sz="1350" kern="1200">
+                <a:solidFill>
+                  <a:schemeClr val="lt1"/>
+                </a:solidFill>
+                <a:latin typeface="+mn-lt"/>
+                <a:ea typeface="+mn-ea"/>
+                <a:cs typeface="+mn-cs"/>
+              </a:defRPr>
+            </a:lvl6pPr>
+            <a:lvl7pPr marL="2057400" algn="l" defTabSz="685800" rtl="0" eaLnBrk="1" latinLnBrk="0" hangingPunct="1">
+              <a:defRPr sz="1350" kern="1200">
+                <a:solidFill>
+                  <a:schemeClr val="lt1"/>
+                </a:solidFill>
+                <a:latin typeface="+mn-lt"/>
+                <a:ea typeface="+mn-ea"/>
+                <a:cs typeface="+mn-cs"/>
+              </a:defRPr>
+            </a:lvl7pPr>
+            <a:lvl8pPr marL="2400300" algn="l" defTabSz="685800" rtl="0" eaLnBrk="1" latinLnBrk="0" hangingPunct="1">
+              <a:defRPr sz="1350" kern="1200">
+                <a:solidFill>
+                  <a:schemeClr val="lt1"/>
+                </a:solidFill>
+                <a:latin typeface="+mn-lt"/>
+                <a:ea typeface="+mn-ea"/>
+                <a:cs typeface="+mn-cs"/>
+              </a:defRPr>
+            </a:lvl8pPr>
+            <a:lvl9pPr marL="2743200" algn="l" defTabSz="685800" rtl="0" eaLnBrk="1" latinLnBrk="0" hangingPunct="1">
+              <a:defRPr sz="1350" kern="1200">
+                <a:solidFill>
+                  <a:schemeClr val="lt1"/>
+                </a:solidFill>
+                <a:latin typeface="+mn-lt"/>
+                <a:ea typeface="+mn-ea"/>
+                <a:cs typeface="+mn-cs"/>
+              </a:defRPr>
+            </a:lvl9pPr>
+          </a:lstStyle>
+          <a:p>
+            <a:pPr algn="ctr"/>
+            <a:r>
+              <a:rPr lang="es-ES" altLang="zh-CN" sz="2000" dirty="0" smtClean="0">
+                <a:solidFill>
+                  <a:schemeClr val="bg1"/>
+                </a:solidFill>
+              </a:rPr>
+              <a:t>Los Usuarios podrán realizar sitas para el pago de servicios si no desean hacerlo a través de internet, o para la cotización de otros servicios</a:t>
+            </a:r>
+            <a:endParaRPr lang="zh-CN" altLang="en-US" sz="2000" dirty="0">
+              <a:solidFill>
+                <a:schemeClr val="bg1"/>
+              </a:solidFill>
+            </a:endParaRPr>
+          </a:p>
+        </p:txBody>
+      </p:sp>
     </p:spTree>
     <p:extLst>
       <p:ext uri="{BB962C8B-B14F-4D97-AF65-F5344CB8AC3E}">
-        <p14:creationId xmlns:p14="http://schemas.microsoft.com/office/powerpoint/2010/main" val="4110398210"/>
+        <p14:creationId xmlns:p14="http://schemas.microsoft.com/office/powerpoint/2010/main" val="2174911341"/>
       </p:ext>
     </p:extLst>
   </p:cSld>
@@ -15017,8 +17869,8 @@
         </p:nvSpPr>
         <p:spPr>
           <a:xfrm flipH="1">
-            <a:off x="7250197" y="5279409"/>
-            <a:ext cx="4941803" cy="1028161"/>
+            <a:off x="6762749" y="0"/>
+            <a:ext cx="5429250" cy="1551543"/>
           </a:xfrm>
           <a:prstGeom prst="chevron">
             <a:avLst>
@@ -15161,12 +18013,12 @@
           <a:p>
             <a:pPr algn="ctr"/>
             <a:r>
-              <a:rPr lang="es-ES" altLang="zh-CN" sz="2000" dirty="0" smtClean="0">
+              <a:rPr lang="es-SV" altLang="zh-CN" sz="2000" dirty="0" smtClean="0">
                 <a:solidFill>
                   <a:schemeClr val="bg1"/>
                 </a:solidFill>
               </a:rPr>
-              <a:t>El usuario…</a:t>
+              <a:t>La tabla tours-paquetes detallaran la información general de los viajes costos fechas entre otros datos y un tipo para diferenciar si es un paquete o tour</a:t>
             </a:r>
             <a:endParaRPr lang="zh-CN" altLang="en-US" sz="2000" dirty="0">
               <a:solidFill>
@@ -15178,7 +18030,7 @@
       </p:sp>
       <p:pic>
         <p:nvPicPr>
-          <p:cNvPr id="6146" name="Picture 2"/>
+          <p:cNvPr id="5122" name="Picture 2"/>
           <p:cNvPicPr>
             <a:picLocks noChangeAspect="1" noChangeArrowheads="1"/>
           </p:cNvPicPr>
@@ -15199,8 +18051,8 @@
         </p:blipFill>
         <p:spPr bwMode="auto">
           <a:xfrm>
-            <a:off x="504825" y="838200"/>
-            <a:ext cx="5591175" cy="5010670"/>
+            <a:off x="457199" y="267780"/>
+            <a:ext cx="6305551" cy="6371693"/>
           </a:xfrm>
           <a:prstGeom prst="roundRect">
             <a:avLst>
@@ -15223,21 +18075,377 @@
           <a:effectLst>
             <a:reflection blurRad="12700" stA="38000" endPos="28000" dist="5000" dir="5400000" sy="-100000" algn="bl" rotWithShape="0"/>
           </a:effectLst>
-          <a:extLst>
-            <a:ext uri="{909E8E84-426E-40DD-AFC4-6F175D3DCCD1}">
-              <a14:hiddenFill xmlns:a14="http://schemas.microsoft.com/office/drawing/2010/main">
-                <a:solidFill>
-                  <a:schemeClr val="accent1"/>
-                </a:solidFill>
-              </a14:hiddenFill>
-            </a:ext>
-          </a:extLst>
+          <a:extLst/>
         </p:spPr>
       </p:pic>
+      <p:pic>
+        <p:nvPicPr>
+          <p:cNvPr id="2" name="Imagen 1"/>
+          <p:cNvPicPr>
+            <a:picLocks noChangeAspect="1"/>
+          </p:cNvPicPr>
+          <p:nvPr/>
+        </p:nvPicPr>
+        <p:blipFill>
+          <a:blip r:embed="rId3">
+            <a:extLst>
+              <a:ext uri="{28A0092B-C50C-407E-A947-70E740481C1C}">
+                <a14:useLocalDpi xmlns:a14="http://schemas.microsoft.com/office/drawing/2010/main" val="0"/>
+              </a:ext>
+            </a:extLst>
+          </a:blip>
+          <a:stretch>
+            <a:fillRect/>
+          </a:stretch>
+        </p:blipFill>
+        <p:spPr>
+          <a:xfrm>
+            <a:off x="2947673" y="4030910"/>
+            <a:ext cx="1093908" cy="1984299"/>
+          </a:xfrm>
+          <a:prstGeom prst="rect">
+            <a:avLst/>
+          </a:prstGeom>
+        </p:spPr>
+      </p:pic>
+      <p:sp>
+        <p:nvSpPr>
+          <p:cNvPr id="6" name="箭头: V 形 105"/>
+          <p:cNvSpPr/>
+          <p:nvPr/>
+        </p:nvSpPr>
+        <p:spPr>
+          <a:xfrm flipH="1">
+            <a:off x="6762749" y="1673255"/>
+            <a:ext cx="5429250" cy="1028161"/>
+          </a:xfrm>
+          <a:prstGeom prst="chevron">
+            <a:avLst>
+              <a:gd name="adj" fmla="val 29021"/>
+            </a:avLst>
+          </a:prstGeom>
+          <a:gradFill flip="none" rotWithShape="1">
+            <a:gsLst>
+              <a:gs pos="0">
+                <a:srgbClr val="F9AC7D"/>
+              </a:gs>
+              <a:gs pos="100000">
+                <a:srgbClr val="F28893"/>
+              </a:gs>
+            </a:gsLst>
+            <a:lin ang="0" scaled="1"/>
+            <a:tileRect/>
+          </a:gradFill>
+          <a:ln>
+            <a:noFill/>
+          </a:ln>
+        </p:spPr>
+        <p:style>
+          <a:lnRef idx="2">
+            <a:schemeClr val="accent1">
+              <a:shade val="50000"/>
+            </a:schemeClr>
+          </a:lnRef>
+          <a:fillRef idx="1">
+            <a:schemeClr val="accent1"/>
+          </a:fillRef>
+          <a:effectRef idx="0">
+            <a:schemeClr val="accent1"/>
+          </a:effectRef>
+          <a:fontRef idx="minor">
+            <a:schemeClr val="lt1"/>
+          </a:fontRef>
+        </p:style>
+        <p:txBody>
+          <a:bodyPr rtlCol="0" anchor="ctr"/>
+          <a:lstStyle>
+            <a:defPPr>
+              <a:defRPr lang="en-US">
+                <a:solidFill>
+                  <a:schemeClr val="lt1"/>
+                </a:solidFill>
+              </a:defRPr>
+            </a:defPPr>
+            <a:lvl1pPr marL="0" algn="l" defTabSz="685800" rtl="0" eaLnBrk="1" latinLnBrk="0" hangingPunct="1">
+              <a:defRPr sz="1350" kern="1200">
+                <a:solidFill>
+                  <a:schemeClr val="lt1"/>
+                </a:solidFill>
+                <a:latin typeface="+mn-lt"/>
+                <a:ea typeface="+mn-ea"/>
+                <a:cs typeface="+mn-cs"/>
+              </a:defRPr>
+            </a:lvl1pPr>
+            <a:lvl2pPr marL="342900" algn="l" defTabSz="685800" rtl="0" eaLnBrk="1" latinLnBrk="0" hangingPunct="1">
+              <a:defRPr sz="1350" kern="1200">
+                <a:solidFill>
+                  <a:schemeClr val="lt1"/>
+                </a:solidFill>
+                <a:latin typeface="+mn-lt"/>
+                <a:ea typeface="+mn-ea"/>
+                <a:cs typeface="+mn-cs"/>
+              </a:defRPr>
+            </a:lvl2pPr>
+            <a:lvl3pPr marL="685800" algn="l" defTabSz="685800" rtl="0" eaLnBrk="1" latinLnBrk="0" hangingPunct="1">
+              <a:defRPr sz="1350" kern="1200">
+                <a:solidFill>
+                  <a:schemeClr val="lt1"/>
+                </a:solidFill>
+                <a:latin typeface="+mn-lt"/>
+                <a:ea typeface="+mn-ea"/>
+                <a:cs typeface="+mn-cs"/>
+              </a:defRPr>
+            </a:lvl3pPr>
+            <a:lvl4pPr marL="1028700" algn="l" defTabSz="685800" rtl="0" eaLnBrk="1" latinLnBrk="0" hangingPunct="1">
+              <a:defRPr sz="1350" kern="1200">
+                <a:solidFill>
+                  <a:schemeClr val="lt1"/>
+                </a:solidFill>
+                <a:latin typeface="+mn-lt"/>
+                <a:ea typeface="+mn-ea"/>
+                <a:cs typeface="+mn-cs"/>
+              </a:defRPr>
+            </a:lvl4pPr>
+            <a:lvl5pPr marL="1371600" algn="l" defTabSz="685800" rtl="0" eaLnBrk="1" latinLnBrk="0" hangingPunct="1">
+              <a:defRPr sz="1350" kern="1200">
+                <a:solidFill>
+                  <a:schemeClr val="lt1"/>
+                </a:solidFill>
+                <a:latin typeface="+mn-lt"/>
+                <a:ea typeface="+mn-ea"/>
+                <a:cs typeface="+mn-cs"/>
+              </a:defRPr>
+            </a:lvl5pPr>
+            <a:lvl6pPr marL="1714500" algn="l" defTabSz="685800" rtl="0" eaLnBrk="1" latinLnBrk="0" hangingPunct="1">
+              <a:defRPr sz="1350" kern="1200">
+                <a:solidFill>
+                  <a:schemeClr val="lt1"/>
+                </a:solidFill>
+                <a:latin typeface="+mn-lt"/>
+                <a:ea typeface="+mn-ea"/>
+                <a:cs typeface="+mn-cs"/>
+              </a:defRPr>
+            </a:lvl6pPr>
+            <a:lvl7pPr marL="2057400" algn="l" defTabSz="685800" rtl="0" eaLnBrk="1" latinLnBrk="0" hangingPunct="1">
+              <a:defRPr sz="1350" kern="1200">
+                <a:solidFill>
+                  <a:schemeClr val="lt1"/>
+                </a:solidFill>
+                <a:latin typeface="+mn-lt"/>
+                <a:ea typeface="+mn-ea"/>
+                <a:cs typeface="+mn-cs"/>
+              </a:defRPr>
+            </a:lvl7pPr>
+            <a:lvl8pPr marL="2400300" algn="l" defTabSz="685800" rtl="0" eaLnBrk="1" latinLnBrk="0" hangingPunct="1">
+              <a:defRPr sz="1350" kern="1200">
+                <a:solidFill>
+                  <a:schemeClr val="lt1"/>
+                </a:solidFill>
+                <a:latin typeface="+mn-lt"/>
+                <a:ea typeface="+mn-ea"/>
+                <a:cs typeface="+mn-cs"/>
+              </a:defRPr>
+            </a:lvl8pPr>
+            <a:lvl9pPr marL="2743200" algn="l" defTabSz="685800" rtl="0" eaLnBrk="1" latinLnBrk="0" hangingPunct="1">
+              <a:defRPr sz="1350" kern="1200">
+                <a:solidFill>
+                  <a:schemeClr val="lt1"/>
+                </a:solidFill>
+                <a:latin typeface="+mn-lt"/>
+                <a:ea typeface="+mn-ea"/>
+                <a:cs typeface="+mn-cs"/>
+              </a:defRPr>
+            </a:lvl9pPr>
+          </a:lstStyle>
+          <a:p>
+            <a:pPr algn="ctr"/>
+            <a:r>
+              <a:rPr lang="es-SV" altLang="zh-CN" sz="2000" dirty="0" smtClean="0">
+                <a:solidFill>
+                  <a:schemeClr val="bg1"/>
+                </a:solidFill>
+              </a:rPr>
+              <a:t>Un tour-paquete puede tener uno o muchos contactos que son los que brindaran servicios en medio del viaje</a:t>
+            </a:r>
+            <a:endParaRPr lang="zh-CN" altLang="en-US" sz="2000" dirty="0">
+              <a:solidFill>
+                <a:schemeClr val="bg1"/>
+              </a:solidFill>
+            </a:endParaRPr>
+          </a:p>
+        </p:txBody>
+      </p:sp>
+      <p:sp>
+        <p:nvSpPr>
+          <p:cNvPr id="7" name="箭头: V 形 105"/>
+          <p:cNvSpPr/>
+          <p:nvPr/>
+        </p:nvSpPr>
+        <p:spPr>
+          <a:xfrm flipH="1">
+            <a:off x="6762749" y="2823128"/>
+            <a:ext cx="5429250" cy="1207782"/>
+          </a:xfrm>
+          <a:prstGeom prst="chevron">
+            <a:avLst>
+              <a:gd name="adj" fmla="val 29021"/>
+            </a:avLst>
+          </a:prstGeom>
+          <a:gradFill flip="none" rotWithShape="1">
+            <a:gsLst>
+              <a:gs pos="0">
+                <a:srgbClr val="F9AC7D"/>
+              </a:gs>
+              <a:gs pos="100000">
+                <a:srgbClr val="F28893"/>
+              </a:gs>
+            </a:gsLst>
+            <a:lin ang="0" scaled="1"/>
+            <a:tileRect/>
+          </a:gradFill>
+          <a:ln>
+            <a:noFill/>
+          </a:ln>
+        </p:spPr>
+        <p:style>
+          <a:lnRef idx="2">
+            <a:schemeClr val="accent1">
+              <a:shade val="50000"/>
+            </a:schemeClr>
+          </a:lnRef>
+          <a:fillRef idx="1">
+            <a:schemeClr val="accent1"/>
+          </a:fillRef>
+          <a:effectRef idx="0">
+            <a:schemeClr val="accent1"/>
+          </a:effectRef>
+          <a:fontRef idx="minor">
+            <a:schemeClr val="lt1"/>
+          </a:fontRef>
+        </p:style>
+        <p:txBody>
+          <a:bodyPr rtlCol="0" anchor="ctr"/>
+          <a:lstStyle>
+            <a:defPPr>
+              <a:defRPr lang="en-US">
+                <a:solidFill>
+                  <a:schemeClr val="lt1"/>
+                </a:solidFill>
+              </a:defRPr>
+            </a:defPPr>
+            <a:lvl1pPr marL="0" algn="l" defTabSz="685800" rtl="0" eaLnBrk="1" latinLnBrk="0" hangingPunct="1">
+              <a:defRPr sz="1350" kern="1200">
+                <a:solidFill>
+                  <a:schemeClr val="lt1"/>
+                </a:solidFill>
+                <a:latin typeface="+mn-lt"/>
+                <a:ea typeface="+mn-ea"/>
+                <a:cs typeface="+mn-cs"/>
+              </a:defRPr>
+            </a:lvl1pPr>
+            <a:lvl2pPr marL="342900" algn="l" defTabSz="685800" rtl="0" eaLnBrk="1" latinLnBrk="0" hangingPunct="1">
+              <a:defRPr sz="1350" kern="1200">
+                <a:solidFill>
+                  <a:schemeClr val="lt1"/>
+                </a:solidFill>
+                <a:latin typeface="+mn-lt"/>
+                <a:ea typeface="+mn-ea"/>
+                <a:cs typeface="+mn-cs"/>
+              </a:defRPr>
+            </a:lvl2pPr>
+            <a:lvl3pPr marL="685800" algn="l" defTabSz="685800" rtl="0" eaLnBrk="1" latinLnBrk="0" hangingPunct="1">
+              <a:defRPr sz="1350" kern="1200">
+                <a:solidFill>
+                  <a:schemeClr val="lt1"/>
+                </a:solidFill>
+                <a:latin typeface="+mn-lt"/>
+                <a:ea typeface="+mn-ea"/>
+                <a:cs typeface="+mn-cs"/>
+              </a:defRPr>
+            </a:lvl3pPr>
+            <a:lvl4pPr marL="1028700" algn="l" defTabSz="685800" rtl="0" eaLnBrk="1" latinLnBrk="0" hangingPunct="1">
+              <a:defRPr sz="1350" kern="1200">
+                <a:solidFill>
+                  <a:schemeClr val="lt1"/>
+                </a:solidFill>
+                <a:latin typeface="+mn-lt"/>
+                <a:ea typeface="+mn-ea"/>
+                <a:cs typeface="+mn-cs"/>
+              </a:defRPr>
+            </a:lvl4pPr>
+            <a:lvl5pPr marL="1371600" algn="l" defTabSz="685800" rtl="0" eaLnBrk="1" latinLnBrk="0" hangingPunct="1">
+              <a:defRPr sz="1350" kern="1200">
+                <a:solidFill>
+                  <a:schemeClr val="lt1"/>
+                </a:solidFill>
+                <a:latin typeface="+mn-lt"/>
+                <a:ea typeface="+mn-ea"/>
+                <a:cs typeface="+mn-cs"/>
+              </a:defRPr>
+            </a:lvl5pPr>
+            <a:lvl6pPr marL="1714500" algn="l" defTabSz="685800" rtl="0" eaLnBrk="1" latinLnBrk="0" hangingPunct="1">
+              <a:defRPr sz="1350" kern="1200">
+                <a:solidFill>
+                  <a:schemeClr val="lt1"/>
+                </a:solidFill>
+                <a:latin typeface="+mn-lt"/>
+                <a:ea typeface="+mn-ea"/>
+                <a:cs typeface="+mn-cs"/>
+              </a:defRPr>
+            </a:lvl6pPr>
+            <a:lvl7pPr marL="2057400" algn="l" defTabSz="685800" rtl="0" eaLnBrk="1" latinLnBrk="0" hangingPunct="1">
+              <a:defRPr sz="1350" kern="1200">
+                <a:solidFill>
+                  <a:schemeClr val="lt1"/>
+                </a:solidFill>
+                <a:latin typeface="+mn-lt"/>
+                <a:ea typeface="+mn-ea"/>
+                <a:cs typeface="+mn-cs"/>
+              </a:defRPr>
+            </a:lvl7pPr>
+            <a:lvl8pPr marL="2400300" algn="l" defTabSz="685800" rtl="0" eaLnBrk="1" latinLnBrk="0" hangingPunct="1">
+              <a:defRPr sz="1350" kern="1200">
+                <a:solidFill>
+                  <a:schemeClr val="lt1"/>
+                </a:solidFill>
+                <a:latin typeface="+mn-lt"/>
+                <a:ea typeface="+mn-ea"/>
+                <a:cs typeface="+mn-cs"/>
+              </a:defRPr>
+            </a:lvl8pPr>
+            <a:lvl9pPr marL="2743200" algn="l" defTabSz="685800" rtl="0" eaLnBrk="1" latinLnBrk="0" hangingPunct="1">
+              <a:defRPr sz="1350" kern="1200">
+                <a:solidFill>
+                  <a:schemeClr val="lt1"/>
+                </a:solidFill>
+                <a:latin typeface="+mn-lt"/>
+                <a:ea typeface="+mn-ea"/>
+                <a:cs typeface="+mn-cs"/>
+              </a:defRPr>
+            </a:lvl9pPr>
+          </a:lstStyle>
+          <a:p>
+            <a:pPr algn="ctr"/>
+            <a:r>
+              <a:rPr lang="es-SV" altLang="zh-CN" sz="2000" dirty="0" smtClean="0">
+                <a:solidFill>
+                  <a:schemeClr val="bg1"/>
+                </a:solidFill>
+              </a:rPr>
+              <a:t>Un usuario puede realizar reservas detallando cuantos asientos desea, si los ocupara un bebe, niño o adulto, y si es apto a un descuento</a:t>
+            </a:r>
+            <a:endParaRPr lang="zh-CN" altLang="en-US" sz="2000" dirty="0">
+              <a:solidFill>
+                <a:schemeClr val="bg1"/>
+              </a:solidFill>
+            </a:endParaRPr>
+          </a:p>
+        </p:txBody>
+      </p:sp>
     </p:spTree>
     <p:extLst>
       <p:ext uri="{BB962C8B-B14F-4D97-AF65-F5344CB8AC3E}">
-        <p14:creationId xmlns:p14="http://schemas.microsoft.com/office/powerpoint/2010/main" val="1792306883"/>
+        <p14:creationId xmlns:p14="http://schemas.microsoft.com/office/powerpoint/2010/main" val="4110398210"/>
       </p:ext>
     </p:extLst>
   </p:cSld>
@@ -15461,7 +18669,7 @@
   <a:extraClrSchemeLst/>
   <a:extLst>
     <a:ext uri="{05A4C25C-085E-4340-85A3-A5531E510DB2}">
-      <thm15:themeFamily xmlns:thm15="http://schemas.microsoft.com/office/thememl/2012/main" xmlns="" name="Office Theme" id="{62F939B6-93AF-4DB8-9C6B-D6C7DFDC589F}" vid="{4A3C46E8-61CC-4603-A589-7422A47A8E4A}"/>
+      <thm15:themeFamily xmlns:thm15="http://schemas.microsoft.com/office/thememl/2012/main" name="Office Theme" id="{62F939B6-93AF-4DB8-9C6B-D6C7DFDC589F}" vid="{4A3C46E8-61CC-4603-A589-7422A47A8E4A}"/>
     </a:ext>
   </a:extLst>
 </a:theme>
@@ -15662,7 +18870,7 @@
   <a:extraClrSchemeLst/>
   <a:extLst>
     <a:ext uri="{05A4C25C-085E-4340-85A3-A5531E510DB2}">
-      <thm15:themeFamily xmlns:thm15="http://schemas.microsoft.com/office/thememl/2012/main" xmlns="" name="Office Theme" id="{62F939B6-93AF-4DB8-9C6B-D6C7DFDC589F}" vid="{4A3C46E8-61CC-4603-A589-7422A47A8E4A}"/>
+      <thm15:themeFamily xmlns:thm15="http://schemas.microsoft.com/office/thememl/2012/main" name="Office Theme" id="{62F939B6-93AF-4DB8-9C6B-D6C7DFDC589F}" vid="{4A3C46E8-61CC-4603-A589-7422A47A8E4A}"/>
     </a:ext>
   </a:extLst>
 </a:theme>
@@ -15863,7 +19071,7 @@
   <a:extraClrSchemeLst/>
   <a:extLst>
     <a:ext uri="{05A4C25C-085E-4340-85A3-A5531E510DB2}">
-      <thm15:themeFamily xmlns:thm15="http://schemas.microsoft.com/office/thememl/2012/main" xmlns="" name="Office Theme" id="{62F939B6-93AF-4DB8-9C6B-D6C7DFDC589F}" vid="{4A3C46E8-61CC-4603-A589-7422A47A8E4A}"/>
+      <thm15:themeFamily xmlns:thm15="http://schemas.microsoft.com/office/thememl/2012/main" name="Office Theme" id="{62F939B6-93AF-4DB8-9C6B-D6C7DFDC589F}" vid="{4A3C46E8-61CC-4603-A589-7422A47A8E4A}"/>
     </a:ext>
   </a:extLst>
 </a:theme>
@@ -16064,7 +19272,7 @@
   <a:extraClrSchemeLst/>
   <a:extLst>
     <a:ext uri="{05A4C25C-085E-4340-85A3-A5531E510DB2}">
-      <thm15:themeFamily xmlns:thm15="http://schemas.microsoft.com/office/thememl/2012/main" xmlns="" name="Office Theme" id="{62F939B6-93AF-4DB8-9C6B-D6C7DFDC589F}" vid="{4A3C46E8-61CC-4603-A589-7422A47A8E4A}"/>
+      <thm15:themeFamily xmlns:thm15="http://schemas.microsoft.com/office/thememl/2012/main" name="Office Theme" id="{62F939B6-93AF-4DB8-9C6B-D6C7DFDC589F}" vid="{4A3C46E8-61CC-4603-A589-7422A47A8E4A}"/>
     </a:ext>
   </a:extLst>
 </a:theme>
@@ -16265,7 +19473,7 @@
   <a:extraClrSchemeLst/>
   <a:extLst>
     <a:ext uri="{05A4C25C-085E-4340-85A3-A5531E510DB2}">
-      <thm15:themeFamily xmlns:thm15="http://schemas.microsoft.com/office/thememl/2012/main" xmlns="" name="Office Theme" id="{62F939B6-93AF-4DB8-9C6B-D6C7DFDC589F}" vid="{4A3C46E8-61CC-4603-A589-7422A47A8E4A}"/>
+      <thm15:themeFamily xmlns:thm15="http://schemas.microsoft.com/office/thememl/2012/main" name="Office Theme" id="{62F939B6-93AF-4DB8-9C6B-D6C7DFDC589F}" vid="{4A3C46E8-61CC-4603-A589-7422A47A8E4A}"/>
     </a:ext>
   </a:extLst>
 </a:theme>
@@ -16526,7 +19734,7 @@
   <a:extraClrSchemeLst/>
   <a:extLst>
     <a:ext uri="{05A4C25C-085E-4340-85A3-A5531E510DB2}">
-      <thm15:themeFamily xmlns:thm15="http://schemas.microsoft.com/office/thememl/2012/main" xmlns="" name="Office Theme" id="{62F939B6-93AF-4DB8-9C6B-D6C7DFDC589F}" vid="{4A3C46E8-61CC-4603-A589-7422A47A8E4A}"/>
+      <thm15:themeFamily xmlns:thm15="http://schemas.microsoft.com/office/thememl/2012/main" name="Office Theme" id="{62F939B6-93AF-4DB8-9C6B-D6C7DFDC589F}" vid="{4A3C46E8-61CC-4603-A589-7422A47A8E4A}"/>
     </a:ext>
   </a:extLst>
 </a:theme>
@@ -16787,7 +19995,7 @@
   <a:extraClrSchemeLst/>
   <a:extLst>
     <a:ext uri="{05A4C25C-085E-4340-85A3-A5531E510DB2}">
-      <thm15:themeFamily xmlns:thm15="http://schemas.microsoft.com/office/thememl/2012/main" xmlns="" name="Office Theme" id="{62F939B6-93AF-4DB8-9C6B-D6C7DFDC589F}" vid="{4A3C46E8-61CC-4603-A589-7422A47A8E4A}"/>
+      <thm15:themeFamily xmlns:thm15="http://schemas.microsoft.com/office/thememl/2012/main" name="Office Theme" id="{62F939B6-93AF-4DB8-9C6B-D6C7DFDC589F}" vid="{4A3C46E8-61CC-4603-A589-7422A47A8E4A}"/>
     </a:ext>
   </a:extLst>
 </a:theme>

</xml_diff>